<commit_message>
Se elimina el cuaderno de optimizadores, al de copia de optimizadores se le llama optimizadores a secas y se sigue con el
</commit_message>
<xml_diff>
--- a/03 Redes fully connected/Imagenes/Figuras.pptx
+++ b/03 Redes fully connected/Imagenes/Figuras.pptx
@@ -7,6 +7,9 @@
   <p:sldIdLst>
     <p:sldId id="257" r:id="rId2"/>
     <p:sldId id="258" r:id="rId3"/>
+    <p:sldId id="259" r:id="rId4"/>
+    <p:sldId id="261" r:id="rId5"/>
+    <p:sldId id="260" r:id="rId6"/>
   </p:sldIdLst>
   <p:sldSz cx="12192000" cy="6858000"/>
   <p:notesSz cx="6858000" cy="9144000"/>
@@ -260,7 +263,7 @@
           <a:p>
             <a:fld id="{DF4DFADA-E375-40DE-968A-CBEA23AA7149}" type="datetimeFigureOut">
               <a:rPr lang="es-ES" smtClean="0"/>
-              <a:t>22/06/2022</a:t>
+              <a:t>14/07/2022</a:t>
             </a:fld>
             <a:endParaRPr lang="es-ES"/>
           </a:p>
@@ -458,7 +461,7 @@
           <a:p>
             <a:fld id="{DF4DFADA-E375-40DE-968A-CBEA23AA7149}" type="datetimeFigureOut">
               <a:rPr lang="es-ES" smtClean="0"/>
-              <a:t>22/06/2022</a:t>
+              <a:t>14/07/2022</a:t>
             </a:fld>
             <a:endParaRPr lang="es-ES"/>
           </a:p>
@@ -666,7 +669,7 @@
           <a:p>
             <a:fld id="{DF4DFADA-E375-40DE-968A-CBEA23AA7149}" type="datetimeFigureOut">
               <a:rPr lang="es-ES" smtClean="0"/>
-              <a:t>22/06/2022</a:t>
+              <a:t>14/07/2022</a:t>
             </a:fld>
             <a:endParaRPr lang="es-ES"/>
           </a:p>
@@ -864,7 +867,7 @@
           <a:p>
             <a:fld id="{DF4DFADA-E375-40DE-968A-CBEA23AA7149}" type="datetimeFigureOut">
               <a:rPr lang="es-ES" smtClean="0"/>
-              <a:t>22/06/2022</a:t>
+              <a:t>14/07/2022</a:t>
             </a:fld>
             <a:endParaRPr lang="es-ES"/>
           </a:p>
@@ -1139,7 +1142,7 @@
           <a:p>
             <a:fld id="{DF4DFADA-E375-40DE-968A-CBEA23AA7149}" type="datetimeFigureOut">
               <a:rPr lang="es-ES" smtClean="0"/>
-              <a:t>22/06/2022</a:t>
+              <a:t>14/07/2022</a:t>
             </a:fld>
             <a:endParaRPr lang="es-ES"/>
           </a:p>
@@ -1404,7 +1407,7 @@
           <a:p>
             <a:fld id="{DF4DFADA-E375-40DE-968A-CBEA23AA7149}" type="datetimeFigureOut">
               <a:rPr lang="es-ES" smtClean="0"/>
-              <a:t>22/06/2022</a:t>
+              <a:t>14/07/2022</a:t>
             </a:fld>
             <a:endParaRPr lang="es-ES"/>
           </a:p>
@@ -1816,7 +1819,7 @@
           <a:p>
             <a:fld id="{DF4DFADA-E375-40DE-968A-CBEA23AA7149}" type="datetimeFigureOut">
               <a:rPr lang="es-ES" smtClean="0"/>
-              <a:t>22/06/2022</a:t>
+              <a:t>14/07/2022</a:t>
             </a:fld>
             <a:endParaRPr lang="es-ES"/>
           </a:p>
@@ -1957,7 +1960,7 @@
           <a:p>
             <a:fld id="{DF4DFADA-E375-40DE-968A-CBEA23AA7149}" type="datetimeFigureOut">
               <a:rPr lang="es-ES" smtClean="0"/>
-              <a:t>22/06/2022</a:t>
+              <a:t>14/07/2022</a:t>
             </a:fld>
             <a:endParaRPr lang="es-ES"/>
           </a:p>
@@ -2070,7 +2073,7 @@
           <a:p>
             <a:fld id="{DF4DFADA-E375-40DE-968A-CBEA23AA7149}" type="datetimeFigureOut">
               <a:rPr lang="es-ES" smtClean="0"/>
-              <a:t>22/06/2022</a:t>
+              <a:t>14/07/2022</a:t>
             </a:fld>
             <a:endParaRPr lang="es-ES"/>
           </a:p>
@@ -2381,7 +2384,7 @@
           <a:p>
             <a:fld id="{DF4DFADA-E375-40DE-968A-CBEA23AA7149}" type="datetimeFigureOut">
               <a:rPr lang="es-ES" smtClean="0"/>
-              <a:t>22/06/2022</a:t>
+              <a:t>14/07/2022</a:t>
             </a:fld>
             <a:endParaRPr lang="es-ES"/>
           </a:p>
@@ -2669,7 +2672,7 @@
           <a:p>
             <a:fld id="{DF4DFADA-E375-40DE-968A-CBEA23AA7149}" type="datetimeFigureOut">
               <a:rPr lang="es-ES" smtClean="0"/>
-              <a:t>22/06/2022</a:t>
+              <a:t>14/07/2022</a:t>
             </a:fld>
             <a:endParaRPr lang="es-ES"/>
           </a:p>
@@ -2910,7 +2913,7 @@
           <a:p>
             <a:fld id="{DF4DFADA-E375-40DE-968A-CBEA23AA7149}" type="datetimeFigureOut">
               <a:rPr lang="es-ES" smtClean="0"/>
-              <a:t>22/06/2022</a:t>
+              <a:t>14/07/2022</a:t>
             </a:fld>
             <a:endParaRPr lang="es-ES"/>
           </a:p>
@@ -5116,6 +5119,2778 @@
 </p:sld>
 </file>
 
+<file path=ppt/slides/slide3.xml><?xml version="1.0" encoding="utf-8"?>
+<p:sld xmlns:a="http://schemas.openxmlformats.org/drawingml/2006/main" xmlns:r="http://schemas.openxmlformats.org/officeDocument/2006/relationships" xmlns:p="http://schemas.openxmlformats.org/presentationml/2006/main">
+  <p:cSld>
+    <p:spTree>
+      <p:nvGrpSpPr>
+        <p:cNvPr id="1" name=""/>
+        <p:cNvGrpSpPr/>
+        <p:nvPr/>
+      </p:nvGrpSpPr>
+      <p:grpSpPr>
+        <a:xfrm>
+          <a:off x="0" y="0"/>
+          <a:ext cx="0" cy="0"/>
+          <a:chOff x="0" y="0"/>
+          <a:chExt cx="0" cy="0"/>
+        </a:xfrm>
+      </p:grpSpPr>
+      <p:sp>
+        <p:nvSpPr>
+          <p:cNvPr id="2" name="Elipse 1">
+            <a:extLst>
+              <a:ext uri="{FF2B5EF4-FFF2-40B4-BE49-F238E27FC236}">
+                <a16:creationId xmlns:a16="http://schemas.microsoft.com/office/drawing/2014/main" id="{1ACE1420-1E48-3ECE-56E3-A3C647156835}"/>
+              </a:ext>
+            </a:extLst>
+          </p:cNvPr>
+          <p:cNvSpPr/>
+          <p:nvPr/>
+        </p:nvSpPr>
+        <p:spPr>
+          <a:xfrm>
+            <a:off x="2931459" y="2312894"/>
+            <a:ext cx="5400000" cy="1800000"/>
+          </a:xfrm>
+          <a:prstGeom prst="ellipse">
+            <a:avLst/>
+          </a:prstGeom>
+          <a:noFill/>
+          <a:ln w="12700">
+            <a:solidFill>
+              <a:schemeClr val="bg1">
+                <a:lumMod val="50000"/>
+              </a:schemeClr>
+            </a:solidFill>
+          </a:ln>
+        </p:spPr>
+        <p:style>
+          <a:lnRef idx="2">
+            <a:schemeClr val="accent1">
+              <a:shade val="50000"/>
+            </a:schemeClr>
+          </a:lnRef>
+          <a:fillRef idx="1">
+            <a:schemeClr val="accent1"/>
+          </a:fillRef>
+          <a:effectRef idx="0">
+            <a:schemeClr val="accent1"/>
+          </a:effectRef>
+          <a:fontRef idx="minor">
+            <a:schemeClr val="lt1"/>
+          </a:fontRef>
+        </p:style>
+        <p:txBody>
+          <a:bodyPr rtlCol="0" anchor="ctr"/>
+          <a:lstStyle/>
+          <a:p>
+            <a:pPr algn="ctr"/>
+            <a:endParaRPr lang="es-ES"/>
+          </a:p>
+        </p:txBody>
+      </p:sp>
+      <p:sp>
+        <p:nvSpPr>
+          <p:cNvPr id="3" name="Elipse 2">
+            <a:extLst>
+              <a:ext uri="{FF2B5EF4-FFF2-40B4-BE49-F238E27FC236}">
+                <a16:creationId xmlns:a16="http://schemas.microsoft.com/office/drawing/2014/main" id="{1659EA3A-2328-3068-DC2A-2110D5EFA2E1}"/>
+              </a:ext>
+            </a:extLst>
+          </p:cNvPr>
+          <p:cNvSpPr/>
+          <p:nvPr/>
+        </p:nvSpPr>
+        <p:spPr>
+          <a:xfrm>
+            <a:off x="3111459" y="2492894"/>
+            <a:ext cx="5040000" cy="1440000"/>
+          </a:xfrm>
+          <a:prstGeom prst="ellipse">
+            <a:avLst/>
+          </a:prstGeom>
+          <a:noFill/>
+          <a:ln w="12700">
+            <a:solidFill>
+              <a:schemeClr val="bg1">
+                <a:lumMod val="50000"/>
+              </a:schemeClr>
+            </a:solidFill>
+          </a:ln>
+        </p:spPr>
+        <p:style>
+          <a:lnRef idx="2">
+            <a:schemeClr val="accent1">
+              <a:shade val="50000"/>
+            </a:schemeClr>
+          </a:lnRef>
+          <a:fillRef idx="1">
+            <a:schemeClr val="accent1"/>
+          </a:fillRef>
+          <a:effectRef idx="0">
+            <a:schemeClr val="accent1"/>
+          </a:effectRef>
+          <a:fontRef idx="minor">
+            <a:schemeClr val="lt1"/>
+          </a:fontRef>
+        </p:style>
+        <p:txBody>
+          <a:bodyPr rtlCol="0" anchor="ctr"/>
+          <a:lstStyle/>
+          <a:p>
+            <a:pPr algn="ctr"/>
+            <a:endParaRPr lang="es-ES"/>
+          </a:p>
+        </p:txBody>
+      </p:sp>
+      <p:sp>
+        <p:nvSpPr>
+          <p:cNvPr id="4" name="Elipse 3">
+            <a:extLst>
+              <a:ext uri="{FF2B5EF4-FFF2-40B4-BE49-F238E27FC236}">
+                <a16:creationId xmlns:a16="http://schemas.microsoft.com/office/drawing/2014/main" id="{9CE47558-EC07-327F-756A-BFCF2DEF4F2F}"/>
+              </a:ext>
+            </a:extLst>
+          </p:cNvPr>
+          <p:cNvSpPr/>
+          <p:nvPr/>
+        </p:nvSpPr>
+        <p:spPr>
+          <a:xfrm>
+            <a:off x="3291459" y="2672894"/>
+            <a:ext cx="4680000" cy="1080000"/>
+          </a:xfrm>
+          <a:prstGeom prst="ellipse">
+            <a:avLst/>
+          </a:prstGeom>
+          <a:noFill/>
+          <a:ln w="12700">
+            <a:solidFill>
+              <a:schemeClr val="bg1">
+                <a:lumMod val="50000"/>
+              </a:schemeClr>
+            </a:solidFill>
+          </a:ln>
+        </p:spPr>
+        <p:style>
+          <a:lnRef idx="2">
+            <a:schemeClr val="accent1">
+              <a:shade val="50000"/>
+            </a:schemeClr>
+          </a:lnRef>
+          <a:fillRef idx="1">
+            <a:schemeClr val="accent1"/>
+          </a:fillRef>
+          <a:effectRef idx="0">
+            <a:schemeClr val="accent1"/>
+          </a:effectRef>
+          <a:fontRef idx="minor">
+            <a:schemeClr val="lt1"/>
+          </a:fontRef>
+        </p:style>
+        <p:txBody>
+          <a:bodyPr rtlCol="0" anchor="ctr"/>
+          <a:lstStyle/>
+          <a:p>
+            <a:pPr algn="ctr"/>
+            <a:endParaRPr lang="es-ES"/>
+          </a:p>
+        </p:txBody>
+      </p:sp>
+      <p:sp>
+        <p:nvSpPr>
+          <p:cNvPr id="5" name="Elipse 4">
+            <a:extLst>
+              <a:ext uri="{FF2B5EF4-FFF2-40B4-BE49-F238E27FC236}">
+                <a16:creationId xmlns:a16="http://schemas.microsoft.com/office/drawing/2014/main" id="{9846A566-A346-3507-2175-D14D3A875843}"/>
+              </a:ext>
+            </a:extLst>
+          </p:cNvPr>
+          <p:cNvSpPr/>
+          <p:nvPr/>
+        </p:nvSpPr>
+        <p:spPr>
+          <a:xfrm>
+            <a:off x="3471459" y="2852894"/>
+            <a:ext cx="4320000" cy="720000"/>
+          </a:xfrm>
+          <a:prstGeom prst="ellipse">
+            <a:avLst/>
+          </a:prstGeom>
+          <a:noFill/>
+          <a:ln w="12700">
+            <a:solidFill>
+              <a:schemeClr val="bg1">
+                <a:lumMod val="50000"/>
+              </a:schemeClr>
+            </a:solidFill>
+          </a:ln>
+        </p:spPr>
+        <p:style>
+          <a:lnRef idx="2">
+            <a:schemeClr val="accent1">
+              <a:shade val="50000"/>
+            </a:schemeClr>
+          </a:lnRef>
+          <a:fillRef idx="1">
+            <a:schemeClr val="accent1"/>
+          </a:fillRef>
+          <a:effectRef idx="0">
+            <a:schemeClr val="accent1"/>
+          </a:effectRef>
+          <a:fontRef idx="minor">
+            <a:schemeClr val="lt1"/>
+          </a:fontRef>
+        </p:style>
+        <p:txBody>
+          <a:bodyPr rtlCol="0" anchor="ctr"/>
+          <a:lstStyle/>
+          <a:p>
+            <a:pPr algn="ctr"/>
+            <a:endParaRPr lang="es-ES"/>
+          </a:p>
+        </p:txBody>
+      </p:sp>
+      <p:sp>
+        <p:nvSpPr>
+          <p:cNvPr id="6" name="Elipse 5">
+            <a:extLst>
+              <a:ext uri="{FF2B5EF4-FFF2-40B4-BE49-F238E27FC236}">
+                <a16:creationId xmlns:a16="http://schemas.microsoft.com/office/drawing/2014/main" id="{1A9E9944-79AC-1D2C-1174-69CC70CCA500}"/>
+              </a:ext>
+            </a:extLst>
+          </p:cNvPr>
+          <p:cNvSpPr/>
+          <p:nvPr/>
+        </p:nvSpPr>
+        <p:spPr>
+          <a:xfrm>
+            <a:off x="3651459" y="3032894"/>
+            <a:ext cx="3960000" cy="360000"/>
+          </a:xfrm>
+          <a:prstGeom prst="ellipse">
+            <a:avLst/>
+          </a:prstGeom>
+          <a:noFill/>
+          <a:ln w="12700">
+            <a:solidFill>
+              <a:schemeClr val="bg1">
+                <a:lumMod val="50000"/>
+              </a:schemeClr>
+            </a:solidFill>
+          </a:ln>
+        </p:spPr>
+        <p:style>
+          <a:lnRef idx="2">
+            <a:schemeClr val="accent1">
+              <a:shade val="50000"/>
+            </a:schemeClr>
+          </a:lnRef>
+          <a:fillRef idx="1">
+            <a:schemeClr val="accent1"/>
+          </a:fillRef>
+          <a:effectRef idx="0">
+            <a:schemeClr val="accent1"/>
+          </a:effectRef>
+          <a:fontRef idx="minor">
+            <a:schemeClr val="lt1"/>
+          </a:fontRef>
+        </p:style>
+        <p:txBody>
+          <a:bodyPr rtlCol="0" anchor="ctr"/>
+          <a:lstStyle/>
+          <a:p>
+            <a:pPr algn="ctr"/>
+            <a:endParaRPr lang="es-ES"/>
+          </a:p>
+        </p:txBody>
+      </p:sp>
+      <p:sp>
+        <p:nvSpPr>
+          <p:cNvPr id="31" name="Elipse 30">
+            <a:extLst>
+              <a:ext uri="{FF2B5EF4-FFF2-40B4-BE49-F238E27FC236}">
+                <a16:creationId xmlns:a16="http://schemas.microsoft.com/office/drawing/2014/main" id="{14A9840A-7209-B8DE-4582-637E9A88895A}"/>
+              </a:ext>
+            </a:extLst>
+          </p:cNvPr>
+          <p:cNvSpPr/>
+          <p:nvPr/>
+        </p:nvSpPr>
+        <p:spPr>
+          <a:xfrm>
+            <a:off x="5451459" y="3194894"/>
+            <a:ext cx="360000" cy="36000"/>
+          </a:xfrm>
+          <a:prstGeom prst="ellipse">
+            <a:avLst/>
+          </a:prstGeom>
+          <a:noFill/>
+          <a:ln w="12700">
+            <a:solidFill>
+              <a:schemeClr val="bg1">
+                <a:lumMod val="50000"/>
+              </a:schemeClr>
+            </a:solidFill>
+          </a:ln>
+        </p:spPr>
+        <p:style>
+          <a:lnRef idx="2">
+            <a:schemeClr val="accent1">
+              <a:shade val="50000"/>
+            </a:schemeClr>
+          </a:lnRef>
+          <a:fillRef idx="1">
+            <a:schemeClr val="accent1"/>
+          </a:fillRef>
+          <a:effectRef idx="0">
+            <a:schemeClr val="accent1"/>
+          </a:effectRef>
+          <a:fontRef idx="minor">
+            <a:schemeClr val="lt1"/>
+          </a:fontRef>
+        </p:style>
+        <p:txBody>
+          <a:bodyPr rtlCol="0" anchor="ctr"/>
+          <a:lstStyle/>
+          <a:p>
+            <a:pPr algn="ctr"/>
+            <a:endParaRPr lang="es-ES"/>
+          </a:p>
+        </p:txBody>
+      </p:sp>
+    </p:spTree>
+    <p:extLst>
+      <p:ext uri="{BB962C8B-B14F-4D97-AF65-F5344CB8AC3E}">
+        <p14:creationId xmlns:p14="http://schemas.microsoft.com/office/powerpoint/2010/main" val="3934296050"/>
+      </p:ext>
+    </p:extLst>
+  </p:cSld>
+  <p:clrMapOvr>
+    <a:masterClrMapping/>
+  </p:clrMapOvr>
+</p:sld>
+</file>
+
+<file path=ppt/slides/slide4.xml><?xml version="1.0" encoding="utf-8"?>
+<p:sld xmlns:a="http://schemas.openxmlformats.org/drawingml/2006/main" xmlns:r="http://schemas.openxmlformats.org/officeDocument/2006/relationships" xmlns:p="http://schemas.openxmlformats.org/presentationml/2006/main">
+  <p:cSld>
+    <p:spTree>
+      <p:nvGrpSpPr>
+        <p:cNvPr id="1" name=""/>
+        <p:cNvGrpSpPr/>
+        <p:nvPr/>
+      </p:nvGrpSpPr>
+      <p:grpSpPr>
+        <a:xfrm>
+          <a:off x="0" y="0"/>
+          <a:ext cx="0" cy="0"/>
+          <a:chOff x="0" y="0"/>
+          <a:chExt cx="0" cy="0"/>
+        </a:xfrm>
+      </p:grpSpPr>
+      <p:sp>
+        <p:nvSpPr>
+          <p:cNvPr id="2" name="Elipse 1">
+            <a:extLst>
+              <a:ext uri="{FF2B5EF4-FFF2-40B4-BE49-F238E27FC236}">
+                <a16:creationId xmlns:a16="http://schemas.microsoft.com/office/drawing/2014/main" id="{1ACE1420-1E48-3ECE-56E3-A3C647156835}"/>
+              </a:ext>
+            </a:extLst>
+          </p:cNvPr>
+          <p:cNvSpPr/>
+          <p:nvPr/>
+        </p:nvSpPr>
+        <p:spPr>
+          <a:xfrm>
+            <a:off x="2931459" y="2312894"/>
+            <a:ext cx="5400000" cy="1800000"/>
+          </a:xfrm>
+          <a:prstGeom prst="ellipse">
+            <a:avLst/>
+          </a:prstGeom>
+          <a:noFill/>
+          <a:ln w="12700">
+            <a:solidFill>
+              <a:schemeClr val="bg1">
+                <a:lumMod val="50000"/>
+              </a:schemeClr>
+            </a:solidFill>
+          </a:ln>
+        </p:spPr>
+        <p:style>
+          <a:lnRef idx="2">
+            <a:schemeClr val="accent1">
+              <a:shade val="50000"/>
+            </a:schemeClr>
+          </a:lnRef>
+          <a:fillRef idx="1">
+            <a:schemeClr val="accent1"/>
+          </a:fillRef>
+          <a:effectRef idx="0">
+            <a:schemeClr val="accent1"/>
+          </a:effectRef>
+          <a:fontRef idx="minor">
+            <a:schemeClr val="lt1"/>
+          </a:fontRef>
+        </p:style>
+        <p:txBody>
+          <a:bodyPr rtlCol="0" anchor="ctr"/>
+          <a:lstStyle/>
+          <a:p>
+            <a:pPr algn="ctr"/>
+            <a:endParaRPr lang="es-ES"/>
+          </a:p>
+        </p:txBody>
+      </p:sp>
+      <p:sp>
+        <p:nvSpPr>
+          <p:cNvPr id="3" name="Elipse 2">
+            <a:extLst>
+              <a:ext uri="{FF2B5EF4-FFF2-40B4-BE49-F238E27FC236}">
+                <a16:creationId xmlns:a16="http://schemas.microsoft.com/office/drawing/2014/main" id="{1659EA3A-2328-3068-DC2A-2110D5EFA2E1}"/>
+              </a:ext>
+            </a:extLst>
+          </p:cNvPr>
+          <p:cNvSpPr/>
+          <p:nvPr/>
+        </p:nvSpPr>
+        <p:spPr>
+          <a:xfrm>
+            <a:off x="3111459" y="2492894"/>
+            <a:ext cx="5040000" cy="1440000"/>
+          </a:xfrm>
+          <a:prstGeom prst="ellipse">
+            <a:avLst/>
+          </a:prstGeom>
+          <a:noFill/>
+          <a:ln w="12700">
+            <a:solidFill>
+              <a:schemeClr val="bg1">
+                <a:lumMod val="50000"/>
+              </a:schemeClr>
+            </a:solidFill>
+          </a:ln>
+        </p:spPr>
+        <p:style>
+          <a:lnRef idx="2">
+            <a:schemeClr val="accent1">
+              <a:shade val="50000"/>
+            </a:schemeClr>
+          </a:lnRef>
+          <a:fillRef idx="1">
+            <a:schemeClr val="accent1"/>
+          </a:fillRef>
+          <a:effectRef idx="0">
+            <a:schemeClr val="accent1"/>
+          </a:effectRef>
+          <a:fontRef idx="minor">
+            <a:schemeClr val="lt1"/>
+          </a:fontRef>
+        </p:style>
+        <p:txBody>
+          <a:bodyPr rtlCol="0" anchor="ctr"/>
+          <a:lstStyle/>
+          <a:p>
+            <a:pPr algn="ctr"/>
+            <a:endParaRPr lang="es-ES"/>
+          </a:p>
+        </p:txBody>
+      </p:sp>
+      <p:sp>
+        <p:nvSpPr>
+          <p:cNvPr id="4" name="Elipse 3">
+            <a:extLst>
+              <a:ext uri="{FF2B5EF4-FFF2-40B4-BE49-F238E27FC236}">
+                <a16:creationId xmlns:a16="http://schemas.microsoft.com/office/drawing/2014/main" id="{9CE47558-EC07-327F-756A-BFCF2DEF4F2F}"/>
+              </a:ext>
+            </a:extLst>
+          </p:cNvPr>
+          <p:cNvSpPr/>
+          <p:nvPr/>
+        </p:nvSpPr>
+        <p:spPr>
+          <a:xfrm>
+            <a:off x="3291459" y="2672894"/>
+            <a:ext cx="4680000" cy="1080000"/>
+          </a:xfrm>
+          <a:prstGeom prst="ellipse">
+            <a:avLst/>
+          </a:prstGeom>
+          <a:noFill/>
+          <a:ln w="12700">
+            <a:solidFill>
+              <a:schemeClr val="bg1">
+                <a:lumMod val="50000"/>
+              </a:schemeClr>
+            </a:solidFill>
+          </a:ln>
+        </p:spPr>
+        <p:style>
+          <a:lnRef idx="2">
+            <a:schemeClr val="accent1">
+              <a:shade val="50000"/>
+            </a:schemeClr>
+          </a:lnRef>
+          <a:fillRef idx="1">
+            <a:schemeClr val="accent1"/>
+          </a:fillRef>
+          <a:effectRef idx="0">
+            <a:schemeClr val="accent1"/>
+          </a:effectRef>
+          <a:fontRef idx="minor">
+            <a:schemeClr val="lt1"/>
+          </a:fontRef>
+        </p:style>
+        <p:txBody>
+          <a:bodyPr rtlCol="0" anchor="ctr"/>
+          <a:lstStyle/>
+          <a:p>
+            <a:pPr algn="ctr"/>
+            <a:endParaRPr lang="es-ES"/>
+          </a:p>
+        </p:txBody>
+      </p:sp>
+      <p:sp>
+        <p:nvSpPr>
+          <p:cNvPr id="5" name="Elipse 4">
+            <a:extLst>
+              <a:ext uri="{FF2B5EF4-FFF2-40B4-BE49-F238E27FC236}">
+                <a16:creationId xmlns:a16="http://schemas.microsoft.com/office/drawing/2014/main" id="{9846A566-A346-3507-2175-D14D3A875843}"/>
+              </a:ext>
+            </a:extLst>
+          </p:cNvPr>
+          <p:cNvSpPr/>
+          <p:nvPr/>
+        </p:nvSpPr>
+        <p:spPr>
+          <a:xfrm>
+            <a:off x="3471459" y="2852894"/>
+            <a:ext cx="4320000" cy="720000"/>
+          </a:xfrm>
+          <a:prstGeom prst="ellipse">
+            <a:avLst/>
+          </a:prstGeom>
+          <a:noFill/>
+          <a:ln w="12700">
+            <a:solidFill>
+              <a:schemeClr val="bg1">
+                <a:lumMod val="50000"/>
+              </a:schemeClr>
+            </a:solidFill>
+          </a:ln>
+        </p:spPr>
+        <p:style>
+          <a:lnRef idx="2">
+            <a:schemeClr val="accent1">
+              <a:shade val="50000"/>
+            </a:schemeClr>
+          </a:lnRef>
+          <a:fillRef idx="1">
+            <a:schemeClr val="accent1"/>
+          </a:fillRef>
+          <a:effectRef idx="0">
+            <a:schemeClr val="accent1"/>
+          </a:effectRef>
+          <a:fontRef idx="minor">
+            <a:schemeClr val="lt1"/>
+          </a:fontRef>
+        </p:style>
+        <p:txBody>
+          <a:bodyPr rtlCol="0" anchor="ctr"/>
+          <a:lstStyle/>
+          <a:p>
+            <a:pPr algn="ctr"/>
+            <a:endParaRPr lang="es-ES"/>
+          </a:p>
+        </p:txBody>
+      </p:sp>
+      <p:sp>
+        <p:nvSpPr>
+          <p:cNvPr id="6" name="Elipse 5">
+            <a:extLst>
+              <a:ext uri="{FF2B5EF4-FFF2-40B4-BE49-F238E27FC236}">
+                <a16:creationId xmlns:a16="http://schemas.microsoft.com/office/drawing/2014/main" id="{1A9E9944-79AC-1D2C-1174-69CC70CCA500}"/>
+              </a:ext>
+            </a:extLst>
+          </p:cNvPr>
+          <p:cNvSpPr/>
+          <p:nvPr/>
+        </p:nvSpPr>
+        <p:spPr>
+          <a:xfrm>
+            <a:off x="3651459" y="3032894"/>
+            <a:ext cx="3960000" cy="360000"/>
+          </a:xfrm>
+          <a:prstGeom prst="ellipse">
+            <a:avLst/>
+          </a:prstGeom>
+          <a:noFill/>
+          <a:ln w="12700">
+            <a:solidFill>
+              <a:schemeClr val="bg1">
+                <a:lumMod val="50000"/>
+              </a:schemeClr>
+            </a:solidFill>
+          </a:ln>
+        </p:spPr>
+        <p:style>
+          <a:lnRef idx="2">
+            <a:schemeClr val="accent1">
+              <a:shade val="50000"/>
+            </a:schemeClr>
+          </a:lnRef>
+          <a:fillRef idx="1">
+            <a:schemeClr val="accent1"/>
+          </a:fillRef>
+          <a:effectRef idx="0">
+            <a:schemeClr val="accent1"/>
+          </a:effectRef>
+          <a:fontRef idx="minor">
+            <a:schemeClr val="lt1"/>
+          </a:fontRef>
+        </p:style>
+        <p:txBody>
+          <a:bodyPr rtlCol="0" anchor="ctr"/>
+          <a:lstStyle/>
+          <a:p>
+            <a:pPr algn="ctr"/>
+            <a:endParaRPr lang="es-ES"/>
+          </a:p>
+        </p:txBody>
+      </p:sp>
+      <p:cxnSp>
+        <p:nvCxnSpPr>
+          <p:cNvPr id="8" name="Conector recto de flecha 7">
+            <a:extLst>
+              <a:ext uri="{FF2B5EF4-FFF2-40B4-BE49-F238E27FC236}">
+                <a16:creationId xmlns:a16="http://schemas.microsoft.com/office/drawing/2014/main" id="{5735D0D8-9E82-3501-4D02-393E6939A159}"/>
+              </a:ext>
+            </a:extLst>
+          </p:cNvPr>
+          <p:cNvCxnSpPr/>
+          <p:nvPr/>
+        </p:nvCxnSpPr>
+        <p:spPr>
+          <a:xfrm flipV="1">
+            <a:off x="3291459" y="2852894"/>
+            <a:ext cx="180000" cy="643341"/>
+          </a:xfrm>
+          <a:prstGeom prst="straightConnector1">
+            <a:avLst/>
+          </a:prstGeom>
+          <a:ln w="12700">
+            <a:tailEnd type="triangle"/>
+          </a:ln>
+        </p:spPr>
+        <p:style>
+          <a:lnRef idx="1">
+            <a:schemeClr val="accent1"/>
+          </a:lnRef>
+          <a:fillRef idx="0">
+            <a:schemeClr val="accent1"/>
+          </a:fillRef>
+          <a:effectRef idx="0">
+            <a:schemeClr val="accent1"/>
+          </a:effectRef>
+          <a:fontRef idx="minor">
+            <a:schemeClr val="tx1"/>
+          </a:fontRef>
+        </p:style>
+      </p:cxnSp>
+      <p:cxnSp>
+        <p:nvCxnSpPr>
+          <p:cNvPr id="9" name="Conector recto de flecha 8">
+            <a:extLst>
+              <a:ext uri="{FF2B5EF4-FFF2-40B4-BE49-F238E27FC236}">
+                <a16:creationId xmlns:a16="http://schemas.microsoft.com/office/drawing/2014/main" id="{13FB297A-FF25-5AB1-2F4B-FDE3F06E7B67}"/>
+              </a:ext>
+            </a:extLst>
+          </p:cNvPr>
+          <p:cNvCxnSpPr>
+            <a:cxnSpLocks/>
+          </p:cNvCxnSpPr>
+          <p:nvPr/>
+        </p:nvCxnSpPr>
+        <p:spPr>
+          <a:xfrm>
+            <a:off x="3471459" y="2852894"/>
+            <a:ext cx="111846" cy="643341"/>
+          </a:xfrm>
+          <a:prstGeom prst="straightConnector1">
+            <a:avLst/>
+          </a:prstGeom>
+          <a:ln w="12700">
+            <a:tailEnd type="triangle"/>
+          </a:ln>
+        </p:spPr>
+        <p:style>
+          <a:lnRef idx="1">
+            <a:schemeClr val="accent1"/>
+          </a:lnRef>
+          <a:fillRef idx="0">
+            <a:schemeClr val="accent1"/>
+          </a:fillRef>
+          <a:effectRef idx="0">
+            <a:schemeClr val="accent1"/>
+          </a:effectRef>
+          <a:fontRef idx="minor">
+            <a:schemeClr val="tx1"/>
+          </a:fontRef>
+        </p:style>
+      </p:cxnSp>
+      <p:cxnSp>
+        <p:nvCxnSpPr>
+          <p:cNvPr id="12" name="Conector recto de flecha 11">
+            <a:extLst>
+              <a:ext uri="{FF2B5EF4-FFF2-40B4-BE49-F238E27FC236}">
+                <a16:creationId xmlns:a16="http://schemas.microsoft.com/office/drawing/2014/main" id="{DB321C14-AAF8-FA50-5164-63EC6EDC958F}"/>
+              </a:ext>
+            </a:extLst>
+          </p:cNvPr>
+          <p:cNvCxnSpPr>
+            <a:cxnSpLocks/>
+          </p:cNvCxnSpPr>
+          <p:nvPr/>
+        </p:nvCxnSpPr>
+        <p:spPr>
+          <a:xfrm flipV="1">
+            <a:off x="3583305" y="2920365"/>
+            <a:ext cx="68154" cy="575870"/>
+          </a:xfrm>
+          <a:prstGeom prst="straightConnector1">
+            <a:avLst/>
+          </a:prstGeom>
+          <a:ln w="12700">
+            <a:tailEnd type="triangle"/>
+          </a:ln>
+        </p:spPr>
+        <p:style>
+          <a:lnRef idx="1">
+            <a:schemeClr val="accent1"/>
+          </a:lnRef>
+          <a:fillRef idx="0">
+            <a:schemeClr val="accent1"/>
+          </a:fillRef>
+          <a:effectRef idx="0">
+            <a:schemeClr val="accent1"/>
+          </a:effectRef>
+          <a:fontRef idx="minor">
+            <a:schemeClr val="tx1"/>
+          </a:fontRef>
+        </p:style>
+      </p:cxnSp>
+      <p:cxnSp>
+        <p:nvCxnSpPr>
+          <p:cNvPr id="15" name="Conector recto de flecha 14">
+            <a:extLst>
+              <a:ext uri="{FF2B5EF4-FFF2-40B4-BE49-F238E27FC236}">
+                <a16:creationId xmlns:a16="http://schemas.microsoft.com/office/drawing/2014/main" id="{54AE4569-6221-35E3-020F-D118B7A02CB9}"/>
+              </a:ext>
+            </a:extLst>
+          </p:cNvPr>
+          <p:cNvCxnSpPr>
+            <a:cxnSpLocks/>
+          </p:cNvCxnSpPr>
+          <p:nvPr/>
+        </p:nvCxnSpPr>
+        <p:spPr>
+          <a:xfrm>
+            <a:off x="3651459" y="2929553"/>
+            <a:ext cx="126156" cy="499447"/>
+          </a:xfrm>
+          <a:prstGeom prst="straightConnector1">
+            <a:avLst/>
+          </a:prstGeom>
+          <a:ln w="12700">
+            <a:tailEnd type="triangle"/>
+          </a:ln>
+        </p:spPr>
+        <p:style>
+          <a:lnRef idx="1">
+            <a:schemeClr val="accent1"/>
+          </a:lnRef>
+          <a:fillRef idx="0">
+            <a:schemeClr val="accent1"/>
+          </a:fillRef>
+          <a:effectRef idx="0">
+            <a:schemeClr val="accent1"/>
+          </a:effectRef>
+          <a:fontRef idx="minor">
+            <a:schemeClr val="tx1"/>
+          </a:fontRef>
+        </p:style>
+      </p:cxnSp>
+      <p:cxnSp>
+        <p:nvCxnSpPr>
+          <p:cNvPr id="18" name="Conector recto de flecha 17">
+            <a:extLst>
+              <a:ext uri="{FF2B5EF4-FFF2-40B4-BE49-F238E27FC236}">
+                <a16:creationId xmlns:a16="http://schemas.microsoft.com/office/drawing/2014/main" id="{3854937B-55F3-2DC9-ADEB-F9EBD22519E5}"/>
+              </a:ext>
+            </a:extLst>
+          </p:cNvPr>
+          <p:cNvCxnSpPr>
+            <a:cxnSpLocks/>
+          </p:cNvCxnSpPr>
+          <p:nvPr/>
+        </p:nvCxnSpPr>
+        <p:spPr>
+          <a:xfrm flipV="1">
+            <a:off x="3777615" y="3032894"/>
+            <a:ext cx="81915" cy="380277"/>
+          </a:xfrm>
+          <a:prstGeom prst="straightConnector1">
+            <a:avLst/>
+          </a:prstGeom>
+          <a:ln w="12700">
+            <a:tailEnd type="triangle"/>
+          </a:ln>
+        </p:spPr>
+        <p:style>
+          <a:lnRef idx="1">
+            <a:schemeClr val="accent1"/>
+          </a:lnRef>
+          <a:fillRef idx="0">
+            <a:schemeClr val="accent1"/>
+          </a:fillRef>
+          <a:effectRef idx="0">
+            <a:schemeClr val="accent1"/>
+          </a:effectRef>
+          <a:fontRef idx="minor">
+            <a:schemeClr val="tx1"/>
+          </a:fontRef>
+        </p:style>
+      </p:cxnSp>
+      <p:cxnSp>
+        <p:nvCxnSpPr>
+          <p:cNvPr id="21" name="Conector recto de flecha 20">
+            <a:extLst>
+              <a:ext uri="{FF2B5EF4-FFF2-40B4-BE49-F238E27FC236}">
+                <a16:creationId xmlns:a16="http://schemas.microsoft.com/office/drawing/2014/main" id="{AE9C69C3-CA33-491C-7153-54369BC07694}"/>
+              </a:ext>
+            </a:extLst>
+          </p:cNvPr>
+          <p:cNvCxnSpPr>
+            <a:cxnSpLocks/>
+          </p:cNvCxnSpPr>
+          <p:nvPr/>
+        </p:nvCxnSpPr>
+        <p:spPr>
+          <a:xfrm>
+            <a:off x="3859530" y="3032894"/>
+            <a:ext cx="68154" cy="338956"/>
+          </a:xfrm>
+          <a:prstGeom prst="straightConnector1">
+            <a:avLst/>
+          </a:prstGeom>
+          <a:ln w="12700">
+            <a:tailEnd type="triangle"/>
+          </a:ln>
+        </p:spPr>
+        <p:style>
+          <a:lnRef idx="1">
+            <a:schemeClr val="accent1"/>
+          </a:lnRef>
+          <a:fillRef idx="0">
+            <a:schemeClr val="accent1"/>
+          </a:fillRef>
+          <a:effectRef idx="0">
+            <a:schemeClr val="accent1"/>
+          </a:effectRef>
+          <a:fontRef idx="minor">
+            <a:schemeClr val="tx1"/>
+          </a:fontRef>
+        </p:style>
+      </p:cxnSp>
+      <p:cxnSp>
+        <p:nvCxnSpPr>
+          <p:cNvPr id="24" name="Conector recto de flecha 23">
+            <a:extLst>
+              <a:ext uri="{FF2B5EF4-FFF2-40B4-BE49-F238E27FC236}">
+                <a16:creationId xmlns:a16="http://schemas.microsoft.com/office/drawing/2014/main" id="{1C061B32-1445-7BE5-E574-682D7F2764A6}"/>
+              </a:ext>
+            </a:extLst>
+          </p:cNvPr>
+          <p:cNvCxnSpPr>
+            <a:cxnSpLocks/>
+          </p:cNvCxnSpPr>
+          <p:nvPr/>
+        </p:nvCxnSpPr>
+        <p:spPr>
+          <a:xfrm flipV="1">
+            <a:off x="3927684" y="3108960"/>
+            <a:ext cx="81915" cy="262890"/>
+          </a:xfrm>
+          <a:prstGeom prst="straightConnector1">
+            <a:avLst/>
+          </a:prstGeom>
+          <a:ln w="12700">
+            <a:tailEnd type="triangle"/>
+          </a:ln>
+        </p:spPr>
+        <p:style>
+          <a:lnRef idx="1">
+            <a:schemeClr val="accent1"/>
+          </a:lnRef>
+          <a:fillRef idx="0">
+            <a:schemeClr val="accent1"/>
+          </a:fillRef>
+          <a:effectRef idx="0">
+            <a:schemeClr val="accent1"/>
+          </a:effectRef>
+          <a:fontRef idx="minor">
+            <a:schemeClr val="tx1"/>
+          </a:fontRef>
+        </p:style>
+      </p:cxnSp>
+      <p:cxnSp>
+        <p:nvCxnSpPr>
+          <p:cNvPr id="28" name="Conector recto de flecha 27">
+            <a:extLst>
+              <a:ext uri="{FF2B5EF4-FFF2-40B4-BE49-F238E27FC236}">
+                <a16:creationId xmlns:a16="http://schemas.microsoft.com/office/drawing/2014/main" id="{73877A30-7E01-F942-38E5-0CB2B8F1F612}"/>
+              </a:ext>
+            </a:extLst>
+          </p:cNvPr>
+          <p:cNvCxnSpPr>
+            <a:cxnSpLocks/>
+          </p:cNvCxnSpPr>
+          <p:nvPr/>
+        </p:nvCxnSpPr>
+        <p:spPr>
+          <a:xfrm>
+            <a:off x="4009599" y="3108960"/>
+            <a:ext cx="84246" cy="217873"/>
+          </a:xfrm>
+          <a:prstGeom prst="straightConnector1">
+            <a:avLst/>
+          </a:prstGeom>
+          <a:ln w="12700">
+            <a:tailEnd type="triangle"/>
+          </a:ln>
+        </p:spPr>
+        <p:style>
+          <a:lnRef idx="1">
+            <a:schemeClr val="accent1"/>
+          </a:lnRef>
+          <a:fillRef idx="0">
+            <a:schemeClr val="accent1"/>
+          </a:fillRef>
+          <a:effectRef idx="0">
+            <a:schemeClr val="accent1"/>
+          </a:effectRef>
+          <a:fontRef idx="minor">
+            <a:schemeClr val="tx1"/>
+          </a:fontRef>
+        </p:style>
+      </p:cxnSp>
+      <p:sp>
+        <p:nvSpPr>
+          <p:cNvPr id="31" name="Elipse 30">
+            <a:extLst>
+              <a:ext uri="{FF2B5EF4-FFF2-40B4-BE49-F238E27FC236}">
+                <a16:creationId xmlns:a16="http://schemas.microsoft.com/office/drawing/2014/main" id="{14A9840A-7209-B8DE-4582-637E9A88895A}"/>
+              </a:ext>
+            </a:extLst>
+          </p:cNvPr>
+          <p:cNvSpPr/>
+          <p:nvPr/>
+        </p:nvSpPr>
+        <p:spPr>
+          <a:xfrm>
+            <a:off x="5451459" y="3194894"/>
+            <a:ext cx="360000" cy="36000"/>
+          </a:xfrm>
+          <a:prstGeom prst="ellipse">
+            <a:avLst/>
+          </a:prstGeom>
+          <a:noFill/>
+          <a:ln w="12700">
+            <a:solidFill>
+              <a:schemeClr val="bg1">
+                <a:lumMod val="50000"/>
+              </a:schemeClr>
+            </a:solidFill>
+          </a:ln>
+        </p:spPr>
+        <p:style>
+          <a:lnRef idx="2">
+            <a:schemeClr val="accent1">
+              <a:shade val="50000"/>
+            </a:schemeClr>
+          </a:lnRef>
+          <a:fillRef idx="1">
+            <a:schemeClr val="accent1"/>
+          </a:fillRef>
+          <a:effectRef idx="0">
+            <a:schemeClr val="accent1"/>
+          </a:effectRef>
+          <a:fontRef idx="minor">
+            <a:schemeClr val="lt1"/>
+          </a:fontRef>
+        </p:style>
+        <p:txBody>
+          <a:bodyPr rtlCol="0" anchor="ctr"/>
+          <a:lstStyle/>
+          <a:p>
+            <a:pPr algn="ctr"/>
+            <a:endParaRPr lang="es-ES"/>
+          </a:p>
+        </p:txBody>
+      </p:sp>
+    </p:spTree>
+    <p:extLst>
+      <p:ext uri="{BB962C8B-B14F-4D97-AF65-F5344CB8AC3E}">
+        <p14:creationId xmlns:p14="http://schemas.microsoft.com/office/powerpoint/2010/main" val="1194025342"/>
+      </p:ext>
+    </p:extLst>
+  </p:cSld>
+  <p:clrMapOvr>
+    <a:masterClrMapping/>
+  </p:clrMapOvr>
+</p:sld>
+</file>
+
+<file path=ppt/slides/slide5.xml><?xml version="1.0" encoding="utf-8"?>
+<p:sld xmlns:a="http://schemas.openxmlformats.org/drawingml/2006/main" xmlns:r="http://schemas.openxmlformats.org/officeDocument/2006/relationships" xmlns:p="http://schemas.openxmlformats.org/presentationml/2006/main">
+  <p:cSld>
+    <p:spTree>
+      <p:nvGrpSpPr>
+        <p:cNvPr id="1" name=""/>
+        <p:cNvGrpSpPr/>
+        <p:nvPr/>
+      </p:nvGrpSpPr>
+      <p:grpSpPr>
+        <a:xfrm>
+          <a:off x="0" y="0"/>
+          <a:ext cx="0" cy="0"/>
+          <a:chOff x="0" y="0"/>
+          <a:chExt cx="0" cy="0"/>
+        </a:xfrm>
+      </p:grpSpPr>
+      <p:cxnSp>
+        <p:nvCxnSpPr>
+          <p:cNvPr id="53" name="Conector recto de flecha 52">
+            <a:extLst>
+              <a:ext uri="{FF2B5EF4-FFF2-40B4-BE49-F238E27FC236}">
+                <a16:creationId xmlns:a16="http://schemas.microsoft.com/office/drawing/2014/main" id="{23F20107-B813-0926-DF04-85BDCD4CC02F}"/>
+              </a:ext>
+            </a:extLst>
+          </p:cNvPr>
+          <p:cNvCxnSpPr>
+            <a:cxnSpLocks/>
+          </p:cNvCxnSpPr>
+          <p:nvPr/>
+        </p:nvCxnSpPr>
+        <p:spPr>
+          <a:xfrm>
+            <a:off x="3471336" y="2858695"/>
+            <a:ext cx="291723" cy="0"/>
+          </a:xfrm>
+          <a:prstGeom prst="straightConnector1">
+            <a:avLst/>
+          </a:prstGeom>
+          <a:ln w="12700">
+            <a:solidFill>
+              <a:srgbClr val="FFC000"/>
+            </a:solidFill>
+            <a:tailEnd type="triangle"/>
+          </a:ln>
+        </p:spPr>
+        <p:style>
+          <a:lnRef idx="1">
+            <a:schemeClr val="accent1"/>
+          </a:lnRef>
+          <a:fillRef idx="0">
+            <a:schemeClr val="accent1"/>
+          </a:fillRef>
+          <a:effectRef idx="0">
+            <a:schemeClr val="accent1"/>
+          </a:effectRef>
+          <a:fontRef idx="minor">
+            <a:schemeClr val="tx1"/>
+          </a:fontRef>
+        </p:style>
+      </p:cxnSp>
+      <p:cxnSp>
+        <p:nvCxnSpPr>
+          <p:cNvPr id="26" name="Conector recto de flecha 25">
+            <a:extLst>
+              <a:ext uri="{FF2B5EF4-FFF2-40B4-BE49-F238E27FC236}">
+                <a16:creationId xmlns:a16="http://schemas.microsoft.com/office/drawing/2014/main" id="{EF0524CB-9E02-7E18-66CB-B85C37EEC931}"/>
+              </a:ext>
+            </a:extLst>
+          </p:cNvPr>
+          <p:cNvCxnSpPr>
+            <a:cxnSpLocks/>
+          </p:cNvCxnSpPr>
+          <p:nvPr/>
+        </p:nvCxnSpPr>
+        <p:spPr>
+          <a:xfrm>
+            <a:off x="3583059" y="2858695"/>
+            <a:ext cx="180000" cy="0"/>
+          </a:xfrm>
+          <a:prstGeom prst="straightConnector1">
+            <a:avLst/>
+          </a:prstGeom>
+          <a:ln w="12700">
+            <a:solidFill>
+              <a:srgbClr val="92D050"/>
+            </a:solidFill>
+            <a:tailEnd type="triangle"/>
+          </a:ln>
+        </p:spPr>
+        <p:style>
+          <a:lnRef idx="1">
+            <a:schemeClr val="accent1"/>
+          </a:lnRef>
+          <a:fillRef idx="0">
+            <a:schemeClr val="accent1"/>
+          </a:fillRef>
+          <a:effectRef idx="0">
+            <a:schemeClr val="accent1"/>
+          </a:effectRef>
+          <a:fontRef idx="minor">
+            <a:schemeClr val="tx1"/>
+          </a:fontRef>
+        </p:style>
+      </p:cxnSp>
+      <p:sp>
+        <p:nvSpPr>
+          <p:cNvPr id="2" name="Elipse 1">
+            <a:extLst>
+              <a:ext uri="{FF2B5EF4-FFF2-40B4-BE49-F238E27FC236}">
+                <a16:creationId xmlns:a16="http://schemas.microsoft.com/office/drawing/2014/main" id="{1ACE1420-1E48-3ECE-56E3-A3C647156835}"/>
+              </a:ext>
+            </a:extLst>
+          </p:cNvPr>
+          <p:cNvSpPr/>
+          <p:nvPr/>
+        </p:nvSpPr>
+        <p:spPr>
+          <a:xfrm>
+            <a:off x="2931459" y="2312894"/>
+            <a:ext cx="5400000" cy="1800000"/>
+          </a:xfrm>
+          <a:prstGeom prst="ellipse">
+            <a:avLst/>
+          </a:prstGeom>
+          <a:noFill/>
+          <a:ln w="19050">
+            <a:solidFill>
+              <a:schemeClr val="bg1">
+                <a:lumMod val="50000"/>
+              </a:schemeClr>
+            </a:solidFill>
+          </a:ln>
+        </p:spPr>
+        <p:style>
+          <a:lnRef idx="2">
+            <a:schemeClr val="accent1">
+              <a:shade val="50000"/>
+            </a:schemeClr>
+          </a:lnRef>
+          <a:fillRef idx="1">
+            <a:schemeClr val="accent1"/>
+          </a:fillRef>
+          <a:effectRef idx="0">
+            <a:schemeClr val="accent1"/>
+          </a:effectRef>
+          <a:fontRef idx="minor">
+            <a:schemeClr val="lt1"/>
+          </a:fontRef>
+        </p:style>
+        <p:txBody>
+          <a:bodyPr rtlCol="0" anchor="ctr"/>
+          <a:lstStyle/>
+          <a:p>
+            <a:pPr algn="ctr"/>
+            <a:endParaRPr lang="es-ES"/>
+          </a:p>
+        </p:txBody>
+      </p:sp>
+      <p:sp>
+        <p:nvSpPr>
+          <p:cNvPr id="3" name="Elipse 2">
+            <a:extLst>
+              <a:ext uri="{FF2B5EF4-FFF2-40B4-BE49-F238E27FC236}">
+                <a16:creationId xmlns:a16="http://schemas.microsoft.com/office/drawing/2014/main" id="{1659EA3A-2328-3068-DC2A-2110D5EFA2E1}"/>
+              </a:ext>
+            </a:extLst>
+          </p:cNvPr>
+          <p:cNvSpPr/>
+          <p:nvPr/>
+        </p:nvSpPr>
+        <p:spPr>
+          <a:xfrm>
+            <a:off x="3111459" y="2492894"/>
+            <a:ext cx="5040000" cy="1440000"/>
+          </a:xfrm>
+          <a:prstGeom prst="ellipse">
+            <a:avLst/>
+          </a:prstGeom>
+          <a:noFill/>
+          <a:ln w="19050">
+            <a:solidFill>
+              <a:schemeClr val="bg1">
+                <a:lumMod val="50000"/>
+              </a:schemeClr>
+            </a:solidFill>
+          </a:ln>
+        </p:spPr>
+        <p:style>
+          <a:lnRef idx="2">
+            <a:schemeClr val="accent1">
+              <a:shade val="50000"/>
+            </a:schemeClr>
+          </a:lnRef>
+          <a:fillRef idx="1">
+            <a:schemeClr val="accent1"/>
+          </a:fillRef>
+          <a:effectRef idx="0">
+            <a:schemeClr val="accent1"/>
+          </a:effectRef>
+          <a:fontRef idx="minor">
+            <a:schemeClr val="lt1"/>
+          </a:fontRef>
+        </p:style>
+        <p:txBody>
+          <a:bodyPr rtlCol="0" anchor="ctr"/>
+          <a:lstStyle/>
+          <a:p>
+            <a:pPr algn="ctr"/>
+            <a:endParaRPr lang="es-ES"/>
+          </a:p>
+        </p:txBody>
+      </p:sp>
+      <p:sp>
+        <p:nvSpPr>
+          <p:cNvPr id="4" name="Elipse 3">
+            <a:extLst>
+              <a:ext uri="{FF2B5EF4-FFF2-40B4-BE49-F238E27FC236}">
+                <a16:creationId xmlns:a16="http://schemas.microsoft.com/office/drawing/2014/main" id="{9CE47558-EC07-327F-756A-BFCF2DEF4F2F}"/>
+              </a:ext>
+            </a:extLst>
+          </p:cNvPr>
+          <p:cNvSpPr/>
+          <p:nvPr/>
+        </p:nvSpPr>
+        <p:spPr>
+          <a:xfrm>
+            <a:off x="3291459" y="2672894"/>
+            <a:ext cx="4680000" cy="1080000"/>
+          </a:xfrm>
+          <a:prstGeom prst="ellipse">
+            <a:avLst/>
+          </a:prstGeom>
+          <a:noFill/>
+          <a:ln w="19050">
+            <a:solidFill>
+              <a:schemeClr val="bg1">
+                <a:lumMod val="50000"/>
+              </a:schemeClr>
+            </a:solidFill>
+          </a:ln>
+        </p:spPr>
+        <p:style>
+          <a:lnRef idx="2">
+            <a:schemeClr val="accent1">
+              <a:shade val="50000"/>
+            </a:schemeClr>
+          </a:lnRef>
+          <a:fillRef idx="1">
+            <a:schemeClr val="accent1"/>
+          </a:fillRef>
+          <a:effectRef idx="0">
+            <a:schemeClr val="accent1"/>
+          </a:effectRef>
+          <a:fontRef idx="minor">
+            <a:schemeClr val="lt1"/>
+          </a:fontRef>
+        </p:style>
+        <p:txBody>
+          <a:bodyPr rtlCol="0" anchor="ctr"/>
+          <a:lstStyle/>
+          <a:p>
+            <a:pPr algn="ctr"/>
+            <a:endParaRPr lang="es-ES"/>
+          </a:p>
+        </p:txBody>
+      </p:sp>
+      <p:sp>
+        <p:nvSpPr>
+          <p:cNvPr id="5" name="Elipse 4">
+            <a:extLst>
+              <a:ext uri="{FF2B5EF4-FFF2-40B4-BE49-F238E27FC236}">
+                <a16:creationId xmlns:a16="http://schemas.microsoft.com/office/drawing/2014/main" id="{9846A566-A346-3507-2175-D14D3A875843}"/>
+              </a:ext>
+            </a:extLst>
+          </p:cNvPr>
+          <p:cNvSpPr/>
+          <p:nvPr/>
+        </p:nvSpPr>
+        <p:spPr>
+          <a:xfrm>
+            <a:off x="3471459" y="2852894"/>
+            <a:ext cx="4320000" cy="720000"/>
+          </a:xfrm>
+          <a:prstGeom prst="ellipse">
+            <a:avLst/>
+          </a:prstGeom>
+          <a:noFill/>
+          <a:ln w="19050">
+            <a:solidFill>
+              <a:schemeClr val="bg1">
+                <a:lumMod val="50000"/>
+              </a:schemeClr>
+            </a:solidFill>
+          </a:ln>
+        </p:spPr>
+        <p:style>
+          <a:lnRef idx="2">
+            <a:schemeClr val="accent1">
+              <a:shade val="50000"/>
+            </a:schemeClr>
+          </a:lnRef>
+          <a:fillRef idx="1">
+            <a:schemeClr val="accent1"/>
+          </a:fillRef>
+          <a:effectRef idx="0">
+            <a:schemeClr val="accent1"/>
+          </a:effectRef>
+          <a:fontRef idx="minor">
+            <a:schemeClr val="lt1"/>
+          </a:fontRef>
+        </p:style>
+        <p:txBody>
+          <a:bodyPr rtlCol="0" anchor="ctr"/>
+          <a:lstStyle/>
+          <a:p>
+            <a:pPr algn="ctr"/>
+            <a:endParaRPr lang="es-ES"/>
+          </a:p>
+        </p:txBody>
+      </p:sp>
+      <p:sp>
+        <p:nvSpPr>
+          <p:cNvPr id="6" name="Elipse 5">
+            <a:extLst>
+              <a:ext uri="{FF2B5EF4-FFF2-40B4-BE49-F238E27FC236}">
+                <a16:creationId xmlns:a16="http://schemas.microsoft.com/office/drawing/2014/main" id="{1A9E9944-79AC-1D2C-1174-69CC70CCA500}"/>
+              </a:ext>
+            </a:extLst>
+          </p:cNvPr>
+          <p:cNvSpPr/>
+          <p:nvPr/>
+        </p:nvSpPr>
+        <p:spPr>
+          <a:xfrm>
+            <a:off x="3651459" y="3032894"/>
+            <a:ext cx="3960000" cy="360000"/>
+          </a:xfrm>
+          <a:prstGeom prst="ellipse">
+            <a:avLst/>
+          </a:prstGeom>
+          <a:noFill/>
+          <a:ln w="19050">
+            <a:solidFill>
+              <a:schemeClr val="bg1">
+                <a:lumMod val="50000"/>
+              </a:schemeClr>
+            </a:solidFill>
+          </a:ln>
+        </p:spPr>
+        <p:style>
+          <a:lnRef idx="2">
+            <a:schemeClr val="accent1">
+              <a:shade val="50000"/>
+            </a:schemeClr>
+          </a:lnRef>
+          <a:fillRef idx="1">
+            <a:schemeClr val="accent1"/>
+          </a:fillRef>
+          <a:effectRef idx="0">
+            <a:schemeClr val="accent1"/>
+          </a:effectRef>
+          <a:fontRef idx="minor">
+            <a:schemeClr val="lt1"/>
+          </a:fontRef>
+        </p:style>
+        <p:txBody>
+          <a:bodyPr rtlCol="0" anchor="ctr"/>
+          <a:lstStyle/>
+          <a:p>
+            <a:pPr algn="ctr"/>
+            <a:endParaRPr lang="es-ES"/>
+          </a:p>
+        </p:txBody>
+      </p:sp>
+      <p:cxnSp>
+        <p:nvCxnSpPr>
+          <p:cNvPr id="8" name="Conector recto de flecha 7">
+            <a:extLst>
+              <a:ext uri="{FF2B5EF4-FFF2-40B4-BE49-F238E27FC236}">
+                <a16:creationId xmlns:a16="http://schemas.microsoft.com/office/drawing/2014/main" id="{5735D0D8-9E82-3501-4D02-393E6939A159}"/>
+              </a:ext>
+            </a:extLst>
+          </p:cNvPr>
+          <p:cNvCxnSpPr/>
+          <p:nvPr/>
+        </p:nvCxnSpPr>
+        <p:spPr>
+          <a:xfrm flipV="1">
+            <a:off x="3291459" y="2852894"/>
+            <a:ext cx="180000" cy="643341"/>
+          </a:xfrm>
+          <a:prstGeom prst="straightConnector1">
+            <a:avLst/>
+          </a:prstGeom>
+          <a:ln w="12700">
+            <a:tailEnd type="triangle"/>
+          </a:ln>
+        </p:spPr>
+        <p:style>
+          <a:lnRef idx="1">
+            <a:schemeClr val="accent1"/>
+          </a:lnRef>
+          <a:fillRef idx="0">
+            <a:schemeClr val="accent1"/>
+          </a:fillRef>
+          <a:effectRef idx="0">
+            <a:schemeClr val="accent1"/>
+          </a:effectRef>
+          <a:fontRef idx="minor">
+            <a:schemeClr val="tx1"/>
+          </a:fontRef>
+        </p:style>
+      </p:cxnSp>
+      <p:cxnSp>
+        <p:nvCxnSpPr>
+          <p:cNvPr id="9" name="Conector recto de flecha 8">
+            <a:extLst>
+              <a:ext uri="{FF2B5EF4-FFF2-40B4-BE49-F238E27FC236}">
+                <a16:creationId xmlns:a16="http://schemas.microsoft.com/office/drawing/2014/main" id="{13FB297A-FF25-5AB1-2F4B-FDE3F06E7B67}"/>
+              </a:ext>
+            </a:extLst>
+          </p:cNvPr>
+          <p:cNvCxnSpPr>
+            <a:cxnSpLocks/>
+          </p:cNvCxnSpPr>
+          <p:nvPr/>
+        </p:nvCxnSpPr>
+        <p:spPr>
+          <a:xfrm>
+            <a:off x="3471459" y="2852894"/>
+            <a:ext cx="111846" cy="643341"/>
+          </a:xfrm>
+          <a:prstGeom prst="straightConnector1">
+            <a:avLst/>
+          </a:prstGeom>
+          <a:ln w="12700">
+            <a:tailEnd type="triangle"/>
+          </a:ln>
+        </p:spPr>
+        <p:style>
+          <a:lnRef idx="1">
+            <a:schemeClr val="accent1"/>
+          </a:lnRef>
+          <a:fillRef idx="0">
+            <a:schemeClr val="accent1"/>
+          </a:fillRef>
+          <a:effectRef idx="0">
+            <a:schemeClr val="accent1"/>
+          </a:effectRef>
+          <a:fontRef idx="minor">
+            <a:schemeClr val="tx1"/>
+          </a:fontRef>
+        </p:style>
+      </p:cxnSp>
+      <p:cxnSp>
+        <p:nvCxnSpPr>
+          <p:cNvPr id="12" name="Conector recto de flecha 11">
+            <a:extLst>
+              <a:ext uri="{FF2B5EF4-FFF2-40B4-BE49-F238E27FC236}">
+                <a16:creationId xmlns:a16="http://schemas.microsoft.com/office/drawing/2014/main" id="{DB321C14-AAF8-FA50-5164-63EC6EDC958F}"/>
+              </a:ext>
+            </a:extLst>
+          </p:cNvPr>
+          <p:cNvCxnSpPr>
+            <a:cxnSpLocks/>
+          </p:cNvCxnSpPr>
+          <p:nvPr/>
+        </p:nvCxnSpPr>
+        <p:spPr>
+          <a:xfrm>
+            <a:off x="3747684" y="2957294"/>
+            <a:ext cx="222336" cy="98599"/>
+          </a:xfrm>
+          <a:prstGeom prst="straightConnector1">
+            <a:avLst/>
+          </a:prstGeom>
+          <a:ln w="12700">
+            <a:tailEnd type="triangle"/>
+          </a:ln>
+        </p:spPr>
+        <p:style>
+          <a:lnRef idx="1">
+            <a:schemeClr val="accent1"/>
+          </a:lnRef>
+          <a:fillRef idx="0">
+            <a:schemeClr val="accent1"/>
+          </a:fillRef>
+          <a:effectRef idx="0">
+            <a:schemeClr val="accent1"/>
+          </a:effectRef>
+          <a:fontRef idx="minor">
+            <a:schemeClr val="tx1"/>
+          </a:fontRef>
+        </p:style>
+      </p:cxnSp>
+      <p:cxnSp>
+        <p:nvCxnSpPr>
+          <p:cNvPr id="16" name="Conector recto de flecha 15">
+            <a:extLst>
+              <a:ext uri="{FF2B5EF4-FFF2-40B4-BE49-F238E27FC236}">
+                <a16:creationId xmlns:a16="http://schemas.microsoft.com/office/drawing/2014/main" id="{1F521CD8-BF20-8A5E-96E7-E333CC8F9CC1}"/>
+              </a:ext>
+            </a:extLst>
+          </p:cNvPr>
+          <p:cNvCxnSpPr>
+            <a:cxnSpLocks/>
+          </p:cNvCxnSpPr>
+          <p:nvPr/>
+        </p:nvCxnSpPr>
+        <p:spPr>
+          <a:xfrm>
+            <a:off x="3291459" y="3496235"/>
+            <a:ext cx="180000" cy="0"/>
+          </a:xfrm>
+          <a:prstGeom prst="straightConnector1">
+            <a:avLst/>
+          </a:prstGeom>
+          <a:ln w="12700">
+            <a:solidFill>
+              <a:srgbClr val="92D050"/>
+            </a:solidFill>
+            <a:tailEnd type="triangle"/>
+          </a:ln>
+        </p:spPr>
+        <p:style>
+          <a:lnRef idx="1">
+            <a:schemeClr val="accent1"/>
+          </a:lnRef>
+          <a:fillRef idx="0">
+            <a:schemeClr val="accent1"/>
+          </a:fillRef>
+          <a:effectRef idx="0">
+            <a:schemeClr val="accent1"/>
+          </a:effectRef>
+          <a:fontRef idx="minor">
+            <a:schemeClr val="tx1"/>
+          </a:fontRef>
+        </p:style>
+      </p:cxnSp>
+      <p:cxnSp>
+        <p:nvCxnSpPr>
+          <p:cNvPr id="19" name="Conector recto de flecha 18">
+            <a:extLst>
+              <a:ext uri="{FF2B5EF4-FFF2-40B4-BE49-F238E27FC236}">
+                <a16:creationId xmlns:a16="http://schemas.microsoft.com/office/drawing/2014/main" id="{C85062BE-A990-3BCF-45A7-030F6E33967F}"/>
+              </a:ext>
+            </a:extLst>
+          </p:cNvPr>
+          <p:cNvCxnSpPr>
+            <a:cxnSpLocks/>
+          </p:cNvCxnSpPr>
+          <p:nvPr/>
+        </p:nvCxnSpPr>
+        <p:spPr>
+          <a:xfrm flipV="1">
+            <a:off x="3291459" y="2851836"/>
+            <a:ext cx="0" cy="644400"/>
+          </a:xfrm>
+          <a:prstGeom prst="straightConnector1">
+            <a:avLst/>
+          </a:prstGeom>
+          <a:ln w="12700">
+            <a:solidFill>
+              <a:srgbClr val="92D050"/>
+            </a:solidFill>
+            <a:tailEnd type="triangle"/>
+          </a:ln>
+        </p:spPr>
+        <p:style>
+          <a:lnRef idx="1">
+            <a:schemeClr val="accent1"/>
+          </a:lnRef>
+          <a:fillRef idx="0">
+            <a:schemeClr val="accent1"/>
+          </a:fillRef>
+          <a:effectRef idx="0">
+            <a:schemeClr val="accent1"/>
+          </a:effectRef>
+          <a:fontRef idx="minor">
+            <a:schemeClr val="tx1"/>
+          </a:fontRef>
+        </p:style>
+      </p:cxnSp>
+      <p:cxnSp>
+        <p:nvCxnSpPr>
+          <p:cNvPr id="20" name="Conector recto de flecha 19">
+            <a:extLst>
+              <a:ext uri="{FF2B5EF4-FFF2-40B4-BE49-F238E27FC236}">
+                <a16:creationId xmlns:a16="http://schemas.microsoft.com/office/drawing/2014/main" id="{BDC9EBEA-592B-A4BD-781E-22CB6DAA8608}"/>
+              </a:ext>
+            </a:extLst>
+          </p:cNvPr>
+          <p:cNvCxnSpPr>
+            <a:cxnSpLocks/>
+          </p:cNvCxnSpPr>
+          <p:nvPr/>
+        </p:nvCxnSpPr>
+        <p:spPr>
+          <a:xfrm>
+            <a:off x="3471458" y="2851836"/>
+            <a:ext cx="0" cy="643341"/>
+          </a:xfrm>
+          <a:prstGeom prst="straightConnector1">
+            <a:avLst/>
+          </a:prstGeom>
+          <a:ln w="12700">
+            <a:solidFill>
+              <a:srgbClr val="FFFF00"/>
+            </a:solidFill>
+            <a:tailEnd type="triangle"/>
+          </a:ln>
+        </p:spPr>
+        <p:style>
+          <a:lnRef idx="1">
+            <a:schemeClr val="accent1"/>
+          </a:lnRef>
+          <a:fillRef idx="0">
+            <a:schemeClr val="accent1"/>
+          </a:fillRef>
+          <a:effectRef idx="0">
+            <a:schemeClr val="accent1"/>
+          </a:effectRef>
+          <a:fontRef idx="minor">
+            <a:schemeClr val="tx1"/>
+          </a:fontRef>
+        </p:style>
+      </p:cxnSp>
+      <p:cxnSp>
+        <p:nvCxnSpPr>
+          <p:cNvPr id="25" name="Conector recto de flecha 24">
+            <a:extLst>
+              <a:ext uri="{FF2B5EF4-FFF2-40B4-BE49-F238E27FC236}">
+                <a16:creationId xmlns:a16="http://schemas.microsoft.com/office/drawing/2014/main" id="{FDAB6687-B0EF-AAF5-5D5B-C3246A7BAD04}"/>
+              </a:ext>
+            </a:extLst>
+          </p:cNvPr>
+          <p:cNvCxnSpPr>
+            <a:cxnSpLocks/>
+          </p:cNvCxnSpPr>
+          <p:nvPr/>
+        </p:nvCxnSpPr>
+        <p:spPr>
+          <a:xfrm>
+            <a:off x="3471459" y="2855571"/>
+            <a:ext cx="111600" cy="0"/>
+          </a:xfrm>
+          <a:prstGeom prst="straightConnector1">
+            <a:avLst/>
+          </a:prstGeom>
+          <a:ln w="12700">
+            <a:solidFill>
+              <a:srgbClr val="FFFF00"/>
+            </a:solidFill>
+            <a:tailEnd type="triangle"/>
+          </a:ln>
+        </p:spPr>
+        <p:style>
+          <a:lnRef idx="1">
+            <a:schemeClr val="accent1"/>
+          </a:lnRef>
+          <a:fillRef idx="0">
+            <a:schemeClr val="accent1"/>
+          </a:fillRef>
+          <a:effectRef idx="0">
+            <a:schemeClr val="accent1"/>
+          </a:effectRef>
+          <a:fontRef idx="minor">
+            <a:schemeClr val="tx1"/>
+          </a:fontRef>
+        </p:style>
+      </p:cxnSp>
+      <p:cxnSp>
+        <p:nvCxnSpPr>
+          <p:cNvPr id="27" name="Conector recto de flecha 26">
+            <a:extLst>
+              <a:ext uri="{FF2B5EF4-FFF2-40B4-BE49-F238E27FC236}">
+                <a16:creationId xmlns:a16="http://schemas.microsoft.com/office/drawing/2014/main" id="{8348CE45-8105-C1B6-5C7D-811520C78B75}"/>
+              </a:ext>
+            </a:extLst>
+          </p:cNvPr>
+          <p:cNvCxnSpPr>
+            <a:cxnSpLocks/>
+          </p:cNvCxnSpPr>
+          <p:nvPr/>
+        </p:nvCxnSpPr>
+        <p:spPr>
+          <a:xfrm flipV="1">
+            <a:off x="3471458" y="2214295"/>
+            <a:ext cx="0" cy="644400"/>
+          </a:xfrm>
+          <a:prstGeom prst="straightConnector1">
+            <a:avLst/>
+          </a:prstGeom>
+          <a:ln w="12700">
+            <a:solidFill>
+              <a:srgbClr val="92D050"/>
+            </a:solidFill>
+            <a:tailEnd type="triangle"/>
+          </a:ln>
+        </p:spPr>
+        <p:style>
+          <a:lnRef idx="1">
+            <a:schemeClr val="accent1"/>
+          </a:lnRef>
+          <a:fillRef idx="0">
+            <a:schemeClr val="accent1"/>
+          </a:fillRef>
+          <a:effectRef idx="0">
+            <a:schemeClr val="accent1"/>
+          </a:effectRef>
+          <a:fontRef idx="minor">
+            <a:schemeClr val="tx1"/>
+          </a:fontRef>
+        </p:style>
+      </p:cxnSp>
+      <p:cxnSp>
+        <p:nvCxnSpPr>
+          <p:cNvPr id="29" name="Conector recto de flecha 28">
+            <a:extLst>
+              <a:ext uri="{FF2B5EF4-FFF2-40B4-BE49-F238E27FC236}">
+                <a16:creationId xmlns:a16="http://schemas.microsoft.com/office/drawing/2014/main" id="{416E64C1-F714-368A-37BD-479AEF71FB6F}"/>
+              </a:ext>
+            </a:extLst>
+          </p:cNvPr>
+          <p:cNvCxnSpPr>
+            <a:cxnSpLocks/>
+          </p:cNvCxnSpPr>
+          <p:nvPr/>
+        </p:nvCxnSpPr>
+        <p:spPr>
+          <a:xfrm>
+            <a:off x="3471336" y="2851836"/>
+            <a:ext cx="276348" cy="105458"/>
+          </a:xfrm>
+          <a:prstGeom prst="straightConnector1">
+            <a:avLst/>
+          </a:prstGeom>
+          <a:ln w="12700">
+            <a:tailEnd type="triangle"/>
+          </a:ln>
+        </p:spPr>
+        <p:style>
+          <a:lnRef idx="1">
+            <a:schemeClr val="accent1"/>
+          </a:lnRef>
+          <a:fillRef idx="0">
+            <a:schemeClr val="accent1"/>
+          </a:fillRef>
+          <a:effectRef idx="0">
+            <a:schemeClr val="accent1"/>
+          </a:effectRef>
+          <a:fontRef idx="minor">
+            <a:schemeClr val="tx1"/>
+          </a:fontRef>
+        </p:style>
+      </p:cxnSp>
+      <p:cxnSp>
+        <p:nvCxnSpPr>
+          <p:cNvPr id="34" name="Conector recto de flecha 33">
+            <a:extLst>
+              <a:ext uri="{FF2B5EF4-FFF2-40B4-BE49-F238E27FC236}">
+                <a16:creationId xmlns:a16="http://schemas.microsoft.com/office/drawing/2014/main" id="{7EA2AD4A-0E3E-E594-8E44-DF08498AB105}"/>
+              </a:ext>
+            </a:extLst>
+          </p:cNvPr>
+          <p:cNvCxnSpPr>
+            <a:cxnSpLocks/>
+          </p:cNvCxnSpPr>
+          <p:nvPr/>
+        </p:nvCxnSpPr>
+        <p:spPr>
+          <a:xfrm>
+            <a:off x="3970020" y="3055893"/>
+            <a:ext cx="228839" cy="75600"/>
+          </a:xfrm>
+          <a:prstGeom prst="straightConnector1">
+            <a:avLst/>
+          </a:prstGeom>
+          <a:ln w="12700">
+            <a:tailEnd type="triangle"/>
+          </a:ln>
+        </p:spPr>
+        <p:style>
+          <a:lnRef idx="1">
+            <a:schemeClr val="accent1"/>
+          </a:lnRef>
+          <a:fillRef idx="0">
+            <a:schemeClr val="accent1"/>
+          </a:fillRef>
+          <a:effectRef idx="0">
+            <a:schemeClr val="accent1"/>
+          </a:effectRef>
+          <a:fontRef idx="minor">
+            <a:schemeClr val="tx1"/>
+          </a:fontRef>
+        </p:style>
+      </p:cxnSp>
+      <p:cxnSp>
+        <p:nvCxnSpPr>
+          <p:cNvPr id="37" name="Conector recto de flecha 36">
+            <a:extLst>
+              <a:ext uri="{FF2B5EF4-FFF2-40B4-BE49-F238E27FC236}">
+                <a16:creationId xmlns:a16="http://schemas.microsoft.com/office/drawing/2014/main" id="{90F0B2FF-6DA1-4ACE-322A-B2A3E3649501}"/>
+              </a:ext>
+            </a:extLst>
+          </p:cNvPr>
+          <p:cNvCxnSpPr>
+            <a:cxnSpLocks/>
+          </p:cNvCxnSpPr>
+          <p:nvPr/>
+        </p:nvCxnSpPr>
+        <p:spPr>
+          <a:xfrm>
+            <a:off x="4198858" y="3131493"/>
+            <a:ext cx="382667" cy="63401"/>
+          </a:xfrm>
+          <a:prstGeom prst="straightConnector1">
+            <a:avLst/>
+          </a:prstGeom>
+          <a:ln w="12700">
+            <a:tailEnd type="triangle"/>
+          </a:ln>
+        </p:spPr>
+        <p:style>
+          <a:lnRef idx="1">
+            <a:schemeClr val="accent1"/>
+          </a:lnRef>
+          <a:fillRef idx="0">
+            <a:schemeClr val="accent1"/>
+          </a:fillRef>
+          <a:effectRef idx="0">
+            <a:schemeClr val="accent1"/>
+          </a:effectRef>
+          <a:fontRef idx="minor">
+            <a:schemeClr val="tx1"/>
+          </a:fontRef>
+        </p:style>
+      </p:cxnSp>
+      <p:cxnSp>
+        <p:nvCxnSpPr>
+          <p:cNvPr id="40" name="Conector recto de flecha 39">
+            <a:extLst>
+              <a:ext uri="{FF2B5EF4-FFF2-40B4-BE49-F238E27FC236}">
+                <a16:creationId xmlns:a16="http://schemas.microsoft.com/office/drawing/2014/main" id="{09C3A19B-2E17-D051-1EA3-42C4771990C5}"/>
+              </a:ext>
+            </a:extLst>
+          </p:cNvPr>
+          <p:cNvCxnSpPr>
+            <a:cxnSpLocks/>
+          </p:cNvCxnSpPr>
+          <p:nvPr/>
+        </p:nvCxnSpPr>
+        <p:spPr>
+          <a:xfrm>
+            <a:off x="4581525" y="3194894"/>
+            <a:ext cx="526887" cy="18000"/>
+          </a:xfrm>
+          <a:prstGeom prst="straightConnector1">
+            <a:avLst/>
+          </a:prstGeom>
+          <a:ln w="12700">
+            <a:tailEnd type="triangle"/>
+          </a:ln>
+        </p:spPr>
+        <p:style>
+          <a:lnRef idx="1">
+            <a:schemeClr val="accent1"/>
+          </a:lnRef>
+          <a:fillRef idx="0">
+            <a:schemeClr val="accent1"/>
+          </a:fillRef>
+          <a:effectRef idx="0">
+            <a:schemeClr val="accent1"/>
+          </a:effectRef>
+          <a:fontRef idx="minor">
+            <a:schemeClr val="tx1"/>
+          </a:fontRef>
+        </p:style>
+      </p:cxnSp>
+      <p:sp>
+        <p:nvSpPr>
+          <p:cNvPr id="43" name="Elipse 42">
+            <a:extLst>
+              <a:ext uri="{FF2B5EF4-FFF2-40B4-BE49-F238E27FC236}">
+                <a16:creationId xmlns:a16="http://schemas.microsoft.com/office/drawing/2014/main" id="{FDEBEB2E-268E-45F2-847E-A84DD4457984}"/>
+              </a:ext>
+            </a:extLst>
+          </p:cNvPr>
+          <p:cNvSpPr/>
+          <p:nvPr/>
+        </p:nvSpPr>
+        <p:spPr>
+          <a:xfrm>
+            <a:off x="5451459" y="3194894"/>
+            <a:ext cx="360000" cy="36000"/>
+          </a:xfrm>
+          <a:prstGeom prst="ellipse">
+            <a:avLst/>
+          </a:prstGeom>
+          <a:noFill/>
+          <a:ln w="19050">
+            <a:solidFill>
+              <a:schemeClr val="bg1">
+                <a:lumMod val="50000"/>
+              </a:schemeClr>
+            </a:solidFill>
+          </a:ln>
+        </p:spPr>
+        <p:style>
+          <a:lnRef idx="2">
+            <a:schemeClr val="accent1">
+              <a:shade val="50000"/>
+            </a:schemeClr>
+          </a:lnRef>
+          <a:fillRef idx="1">
+            <a:schemeClr val="accent1"/>
+          </a:fillRef>
+          <a:effectRef idx="0">
+            <a:schemeClr val="accent1"/>
+          </a:effectRef>
+          <a:fontRef idx="minor">
+            <a:schemeClr val="lt1"/>
+          </a:fontRef>
+        </p:style>
+        <p:txBody>
+          <a:bodyPr rtlCol="0" anchor="ctr"/>
+          <a:lstStyle/>
+          <a:p>
+            <a:pPr algn="ctr"/>
+            <a:endParaRPr lang="es-ES"/>
+          </a:p>
+        </p:txBody>
+      </p:sp>
+      <p:cxnSp>
+        <p:nvCxnSpPr>
+          <p:cNvPr id="52" name="Conector recto de flecha 51">
+            <a:extLst>
+              <a:ext uri="{FF2B5EF4-FFF2-40B4-BE49-F238E27FC236}">
+                <a16:creationId xmlns:a16="http://schemas.microsoft.com/office/drawing/2014/main" id="{993E12B8-0AB5-E695-EF71-5D83E0B42D71}"/>
+              </a:ext>
+            </a:extLst>
+          </p:cNvPr>
+          <p:cNvCxnSpPr>
+            <a:cxnSpLocks/>
+          </p:cNvCxnSpPr>
+          <p:nvPr/>
+        </p:nvCxnSpPr>
+        <p:spPr>
+          <a:xfrm>
+            <a:off x="3471458" y="2851836"/>
+            <a:ext cx="0" cy="72000"/>
+          </a:xfrm>
+          <a:prstGeom prst="straightConnector1">
+            <a:avLst/>
+          </a:prstGeom>
+          <a:ln w="12700">
+            <a:solidFill>
+              <a:srgbClr val="FFC000"/>
+            </a:solidFill>
+            <a:tailEnd type="triangle"/>
+          </a:ln>
+        </p:spPr>
+        <p:style>
+          <a:lnRef idx="1">
+            <a:schemeClr val="accent1"/>
+          </a:lnRef>
+          <a:fillRef idx="0">
+            <a:schemeClr val="accent1"/>
+          </a:fillRef>
+          <a:effectRef idx="0">
+            <a:schemeClr val="accent1"/>
+          </a:effectRef>
+          <a:fontRef idx="minor">
+            <a:schemeClr val="tx1"/>
+          </a:fontRef>
+        </p:style>
+      </p:cxnSp>
+    </p:spTree>
+    <p:extLst>
+      <p:ext uri="{BB962C8B-B14F-4D97-AF65-F5344CB8AC3E}">
+        <p14:creationId xmlns:p14="http://schemas.microsoft.com/office/powerpoint/2010/main" val="2884586564"/>
+      </p:ext>
+    </p:extLst>
+  </p:cSld>
+  <p:clrMapOvr>
+    <a:masterClrMapping/>
+  </p:clrMapOvr>
+  <p:timing>
+    <p:tnLst>
+      <p:par>
+        <p:cTn id="1" dur="indefinite" restart="never" nodeType="tmRoot">
+          <p:childTnLst>
+            <p:seq concurrent="1" nextAc="seek">
+              <p:cTn id="2" dur="indefinite" nodeType="mainSeq">
+                <p:childTnLst>
+                  <p:par>
+                    <p:cTn id="3" fill="hold">
+                      <p:stCondLst>
+                        <p:cond delay="indefinite"/>
+                      </p:stCondLst>
+                      <p:childTnLst>
+                        <p:par>
+                          <p:cTn id="4" fill="hold">
+                            <p:stCondLst>
+                              <p:cond delay="0"/>
+                            </p:stCondLst>
+                            <p:childTnLst>
+                              <p:par>
+                                <p:cTn id="5" presetID="10" presetClass="entr" presetSubtype="0" fill="hold" nodeType="clickEffect">
+                                  <p:stCondLst>
+                                    <p:cond delay="0"/>
+                                  </p:stCondLst>
+                                  <p:childTnLst>
+                                    <p:set>
+                                      <p:cBhvr>
+                                        <p:cTn id="6" dur="1" fill="hold">
+                                          <p:stCondLst>
+                                            <p:cond delay="0"/>
+                                          </p:stCondLst>
+                                        </p:cTn>
+                                        <p:tgtEl>
+                                          <p:spTgt spid="19"/>
+                                        </p:tgtEl>
+                                        <p:attrNameLst>
+                                          <p:attrName>style.visibility</p:attrName>
+                                        </p:attrNameLst>
+                                      </p:cBhvr>
+                                      <p:to>
+                                        <p:strVal val="visible"/>
+                                      </p:to>
+                                    </p:set>
+                                    <p:animEffect transition="in" filter="fade">
+                                      <p:cBhvr>
+                                        <p:cTn id="7" dur="2000"/>
+                                        <p:tgtEl>
+                                          <p:spTgt spid="19"/>
+                                        </p:tgtEl>
+                                      </p:cBhvr>
+                                    </p:animEffect>
+                                  </p:childTnLst>
+                                </p:cTn>
+                              </p:par>
+                              <p:par>
+                                <p:cTn id="8" presetID="10" presetClass="entr" presetSubtype="0" fill="hold" nodeType="withEffect">
+                                  <p:stCondLst>
+                                    <p:cond delay="0"/>
+                                  </p:stCondLst>
+                                  <p:childTnLst>
+                                    <p:set>
+                                      <p:cBhvr>
+                                        <p:cTn id="9" dur="1" fill="hold">
+                                          <p:stCondLst>
+                                            <p:cond delay="0"/>
+                                          </p:stCondLst>
+                                        </p:cTn>
+                                        <p:tgtEl>
+                                          <p:spTgt spid="16"/>
+                                        </p:tgtEl>
+                                        <p:attrNameLst>
+                                          <p:attrName>style.visibility</p:attrName>
+                                        </p:attrNameLst>
+                                      </p:cBhvr>
+                                      <p:to>
+                                        <p:strVal val="visible"/>
+                                      </p:to>
+                                    </p:set>
+                                    <p:animEffect transition="in" filter="fade">
+                                      <p:cBhvr>
+                                        <p:cTn id="10" dur="2000"/>
+                                        <p:tgtEl>
+                                          <p:spTgt spid="16"/>
+                                        </p:tgtEl>
+                                      </p:cBhvr>
+                                    </p:animEffect>
+                                  </p:childTnLst>
+                                </p:cTn>
+                              </p:par>
+                            </p:childTnLst>
+                          </p:cTn>
+                        </p:par>
+                        <p:par>
+                          <p:cTn id="11" fill="hold">
+                            <p:stCondLst>
+                              <p:cond delay="2000"/>
+                            </p:stCondLst>
+                            <p:childTnLst>
+                              <p:par>
+                                <p:cTn id="12" presetID="1" presetClass="entr" presetSubtype="0" fill="hold" nodeType="afterEffect">
+                                  <p:stCondLst>
+                                    <p:cond delay="0"/>
+                                  </p:stCondLst>
+                                  <p:childTnLst>
+                                    <p:set>
+                                      <p:cBhvr>
+                                        <p:cTn id="13" dur="1" fill="hold">
+                                          <p:stCondLst>
+                                            <p:cond delay="0"/>
+                                          </p:stCondLst>
+                                        </p:cTn>
+                                        <p:tgtEl>
+                                          <p:spTgt spid="9"/>
+                                        </p:tgtEl>
+                                        <p:attrNameLst>
+                                          <p:attrName>style.visibility</p:attrName>
+                                        </p:attrNameLst>
+                                      </p:cBhvr>
+                                      <p:to>
+                                        <p:strVal val="visible"/>
+                                      </p:to>
+                                    </p:set>
+                                  </p:childTnLst>
+                                </p:cTn>
+                              </p:par>
+                            </p:childTnLst>
+                          </p:cTn>
+                        </p:par>
+                        <p:par>
+                          <p:cTn id="14" fill="hold">
+                            <p:stCondLst>
+                              <p:cond delay="2000"/>
+                            </p:stCondLst>
+                            <p:childTnLst>
+                              <p:par>
+                                <p:cTn id="15" presetID="10" presetClass="entr" presetSubtype="0" fill="hold" nodeType="afterEffect">
+                                  <p:stCondLst>
+                                    <p:cond delay="2000"/>
+                                  </p:stCondLst>
+                                  <p:childTnLst>
+                                    <p:set>
+                                      <p:cBhvr>
+                                        <p:cTn id="16" dur="1" fill="hold">
+                                          <p:stCondLst>
+                                            <p:cond delay="0"/>
+                                          </p:stCondLst>
+                                        </p:cTn>
+                                        <p:tgtEl>
+                                          <p:spTgt spid="25"/>
+                                        </p:tgtEl>
+                                        <p:attrNameLst>
+                                          <p:attrName>style.visibility</p:attrName>
+                                        </p:attrNameLst>
+                                      </p:cBhvr>
+                                      <p:to>
+                                        <p:strVal val="visible"/>
+                                      </p:to>
+                                    </p:set>
+                                    <p:animEffect transition="in" filter="fade">
+                                      <p:cBhvr>
+                                        <p:cTn id="17" dur="2000"/>
+                                        <p:tgtEl>
+                                          <p:spTgt spid="25"/>
+                                        </p:tgtEl>
+                                      </p:cBhvr>
+                                    </p:animEffect>
+                                  </p:childTnLst>
+                                </p:cTn>
+                              </p:par>
+                              <p:par>
+                                <p:cTn id="18" presetID="10" presetClass="entr" presetSubtype="0" fill="hold" nodeType="withEffect">
+                                  <p:stCondLst>
+                                    <p:cond delay="2000"/>
+                                  </p:stCondLst>
+                                  <p:childTnLst>
+                                    <p:set>
+                                      <p:cBhvr>
+                                        <p:cTn id="19" dur="1" fill="hold">
+                                          <p:stCondLst>
+                                            <p:cond delay="0"/>
+                                          </p:stCondLst>
+                                        </p:cTn>
+                                        <p:tgtEl>
+                                          <p:spTgt spid="20"/>
+                                        </p:tgtEl>
+                                        <p:attrNameLst>
+                                          <p:attrName>style.visibility</p:attrName>
+                                        </p:attrNameLst>
+                                      </p:cBhvr>
+                                      <p:to>
+                                        <p:strVal val="visible"/>
+                                      </p:to>
+                                    </p:set>
+                                    <p:animEffect transition="in" filter="fade">
+                                      <p:cBhvr>
+                                        <p:cTn id="20" dur="2000"/>
+                                        <p:tgtEl>
+                                          <p:spTgt spid="20"/>
+                                        </p:tgtEl>
+                                      </p:cBhvr>
+                                    </p:animEffect>
+                                  </p:childTnLst>
+                                </p:cTn>
+                              </p:par>
+                            </p:childTnLst>
+                          </p:cTn>
+                        </p:par>
+                        <p:par>
+                          <p:cTn id="21" fill="hold">
+                            <p:stCondLst>
+                              <p:cond delay="6000"/>
+                            </p:stCondLst>
+                            <p:childTnLst>
+                              <p:par>
+                                <p:cTn id="22" presetID="10" presetClass="entr" presetSubtype="0" fill="hold" nodeType="afterEffect">
+                                  <p:stCondLst>
+                                    <p:cond delay="0"/>
+                                  </p:stCondLst>
+                                  <p:childTnLst>
+                                    <p:set>
+                                      <p:cBhvr>
+                                        <p:cTn id="23" dur="1" fill="hold">
+                                          <p:stCondLst>
+                                            <p:cond delay="0"/>
+                                          </p:stCondLst>
+                                        </p:cTn>
+                                        <p:tgtEl>
+                                          <p:spTgt spid="26"/>
+                                        </p:tgtEl>
+                                        <p:attrNameLst>
+                                          <p:attrName>style.visibility</p:attrName>
+                                        </p:attrNameLst>
+                                      </p:cBhvr>
+                                      <p:to>
+                                        <p:strVal val="visible"/>
+                                      </p:to>
+                                    </p:set>
+                                    <p:animEffect transition="in" filter="fade">
+                                      <p:cBhvr>
+                                        <p:cTn id="24" dur="2000"/>
+                                        <p:tgtEl>
+                                          <p:spTgt spid="26"/>
+                                        </p:tgtEl>
+                                      </p:cBhvr>
+                                    </p:animEffect>
+                                  </p:childTnLst>
+                                </p:cTn>
+                              </p:par>
+                              <p:par>
+                                <p:cTn id="25" presetID="10" presetClass="entr" presetSubtype="0" fill="hold" nodeType="withEffect">
+                                  <p:stCondLst>
+                                    <p:cond delay="0"/>
+                                  </p:stCondLst>
+                                  <p:childTnLst>
+                                    <p:set>
+                                      <p:cBhvr>
+                                        <p:cTn id="26" dur="1" fill="hold">
+                                          <p:stCondLst>
+                                            <p:cond delay="0"/>
+                                          </p:stCondLst>
+                                        </p:cTn>
+                                        <p:tgtEl>
+                                          <p:spTgt spid="27"/>
+                                        </p:tgtEl>
+                                        <p:attrNameLst>
+                                          <p:attrName>style.visibility</p:attrName>
+                                        </p:attrNameLst>
+                                      </p:cBhvr>
+                                      <p:to>
+                                        <p:strVal val="visible"/>
+                                      </p:to>
+                                    </p:set>
+                                    <p:animEffect transition="in" filter="fade">
+                                      <p:cBhvr>
+                                        <p:cTn id="27" dur="1500"/>
+                                        <p:tgtEl>
+                                          <p:spTgt spid="27"/>
+                                        </p:tgtEl>
+                                      </p:cBhvr>
+                                    </p:animEffect>
+                                  </p:childTnLst>
+                                </p:cTn>
+                              </p:par>
+                            </p:childTnLst>
+                          </p:cTn>
+                        </p:par>
+                        <p:par>
+                          <p:cTn id="28" fill="hold">
+                            <p:stCondLst>
+                              <p:cond delay="8000"/>
+                            </p:stCondLst>
+                            <p:childTnLst>
+                              <p:par>
+                                <p:cTn id="29" presetID="10" presetClass="exit" presetSubtype="0" fill="hold" nodeType="afterEffect">
+                                  <p:stCondLst>
+                                    <p:cond delay="0"/>
+                                  </p:stCondLst>
+                                  <p:childTnLst>
+                                    <p:animEffect transition="out" filter="fade">
+                                      <p:cBhvr>
+                                        <p:cTn id="30" dur="2000"/>
+                                        <p:tgtEl>
+                                          <p:spTgt spid="25"/>
+                                        </p:tgtEl>
+                                      </p:cBhvr>
+                                    </p:animEffect>
+                                    <p:set>
+                                      <p:cBhvr>
+                                        <p:cTn id="31" dur="1" fill="hold">
+                                          <p:stCondLst>
+                                            <p:cond delay="1999"/>
+                                          </p:stCondLst>
+                                        </p:cTn>
+                                        <p:tgtEl>
+                                          <p:spTgt spid="25"/>
+                                        </p:tgtEl>
+                                        <p:attrNameLst>
+                                          <p:attrName>style.visibility</p:attrName>
+                                        </p:attrNameLst>
+                                      </p:cBhvr>
+                                      <p:to>
+                                        <p:strVal val="hidden"/>
+                                      </p:to>
+                                    </p:set>
+                                  </p:childTnLst>
+                                </p:cTn>
+                              </p:par>
+                              <p:par>
+                                <p:cTn id="32" presetID="10" presetClass="exit" presetSubtype="0" fill="hold" nodeType="withEffect">
+                                  <p:stCondLst>
+                                    <p:cond delay="0"/>
+                                  </p:stCondLst>
+                                  <p:childTnLst>
+                                    <p:animEffect transition="out" filter="fade">
+                                      <p:cBhvr>
+                                        <p:cTn id="33" dur="2000"/>
+                                        <p:tgtEl>
+                                          <p:spTgt spid="20"/>
+                                        </p:tgtEl>
+                                      </p:cBhvr>
+                                    </p:animEffect>
+                                    <p:set>
+                                      <p:cBhvr>
+                                        <p:cTn id="34" dur="1" fill="hold">
+                                          <p:stCondLst>
+                                            <p:cond delay="1999"/>
+                                          </p:stCondLst>
+                                        </p:cTn>
+                                        <p:tgtEl>
+                                          <p:spTgt spid="20"/>
+                                        </p:tgtEl>
+                                        <p:attrNameLst>
+                                          <p:attrName>style.visibility</p:attrName>
+                                        </p:attrNameLst>
+                                      </p:cBhvr>
+                                      <p:to>
+                                        <p:strVal val="hidden"/>
+                                      </p:to>
+                                    </p:set>
+                                  </p:childTnLst>
+                                </p:cTn>
+                              </p:par>
+                              <p:par>
+                                <p:cTn id="35" presetID="10" presetClass="exit" presetSubtype="0" fill="hold" nodeType="withEffect">
+                                  <p:stCondLst>
+                                    <p:cond delay="0"/>
+                                  </p:stCondLst>
+                                  <p:childTnLst>
+                                    <p:animEffect transition="out" filter="fade">
+                                      <p:cBhvr>
+                                        <p:cTn id="36" dur="2000"/>
+                                        <p:tgtEl>
+                                          <p:spTgt spid="26"/>
+                                        </p:tgtEl>
+                                      </p:cBhvr>
+                                    </p:animEffect>
+                                    <p:set>
+                                      <p:cBhvr>
+                                        <p:cTn id="37" dur="1" fill="hold">
+                                          <p:stCondLst>
+                                            <p:cond delay="1999"/>
+                                          </p:stCondLst>
+                                        </p:cTn>
+                                        <p:tgtEl>
+                                          <p:spTgt spid="26"/>
+                                        </p:tgtEl>
+                                        <p:attrNameLst>
+                                          <p:attrName>style.visibility</p:attrName>
+                                        </p:attrNameLst>
+                                      </p:cBhvr>
+                                      <p:to>
+                                        <p:strVal val="hidden"/>
+                                      </p:to>
+                                    </p:set>
+                                  </p:childTnLst>
+                                </p:cTn>
+                              </p:par>
+                              <p:par>
+                                <p:cTn id="38" presetID="10" presetClass="exit" presetSubtype="0" fill="hold" nodeType="withEffect">
+                                  <p:stCondLst>
+                                    <p:cond delay="0"/>
+                                  </p:stCondLst>
+                                  <p:childTnLst>
+                                    <p:animEffect transition="out" filter="fade">
+                                      <p:cBhvr>
+                                        <p:cTn id="39" dur="2000"/>
+                                        <p:tgtEl>
+                                          <p:spTgt spid="27"/>
+                                        </p:tgtEl>
+                                      </p:cBhvr>
+                                    </p:animEffect>
+                                    <p:set>
+                                      <p:cBhvr>
+                                        <p:cTn id="40" dur="1" fill="hold">
+                                          <p:stCondLst>
+                                            <p:cond delay="1999"/>
+                                          </p:stCondLst>
+                                        </p:cTn>
+                                        <p:tgtEl>
+                                          <p:spTgt spid="27"/>
+                                        </p:tgtEl>
+                                        <p:attrNameLst>
+                                          <p:attrName>style.visibility</p:attrName>
+                                        </p:attrNameLst>
+                                      </p:cBhvr>
+                                      <p:to>
+                                        <p:strVal val="hidden"/>
+                                      </p:to>
+                                    </p:set>
+                                  </p:childTnLst>
+                                </p:cTn>
+                              </p:par>
+                            </p:childTnLst>
+                          </p:cTn>
+                        </p:par>
+                        <p:par>
+                          <p:cTn id="41" fill="hold">
+                            <p:stCondLst>
+                              <p:cond delay="10000"/>
+                            </p:stCondLst>
+                            <p:childTnLst>
+                              <p:par>
+                                <p:cTn id="42" presetID="10" presetClass="entr" presetSubtype="0" fill="hold" nodeType="afterEffect">
+                                  <p:stCondLst>
+                                    <p:cond delay="0"/>
+                                  </p:stCondLst>
+                                  <p:childTnLst>
+                                    <p:set>
+                                      <p:cBhvr>
+                                        <p:cTn id="43" dur="1" fill="hold">
+                                          <p:stCondLst>
+                                            <p:cond delay="0"/>
+                                          </p:stCondLst>
+                                        </p:cTn>
+                                        <p:tgtEl>
+                                          <p:spTgt spid="53"/>
+                                        </p:tgtEl>
+                                        <p:attrNameLst>
+                                          <p:attrName>style.visibility</p:attrName>
+                                        </p:attrNameLst>
+                                      </p:cBhvr>
+                                      <p:to>
+                                        <p:strVal val="visible"/>
+                                      </p:to>
+                                    </p:set>
+                                    <p:animEffect transition="in" filter="fade">
+                                      <p:cBhvr>
+                                        <p:cTn id="44" dur="2000"/>
+                                        <p:tgtEl>
+                                          <p:spTgt spid="53"/>
+                                        </p:tgtEl>
+                                      </p:cBhvr>
+                                    </p:animEffect>
+                                  </p:childTnLst>
+                                </p:cTn>
+                              </p:par>
+                              <p:par>
+                                <p:cTn id="45" presetID="10" presetClass="entr" presetSubtype="0" fill="hold" nodeType="withEffect">
+                                  <p:stCondLst>
+                                    <p:cond delay="0"/>
+                                  </p:stCondLst>
+                                  <p:childTnLst>
+                                    <p:set>
+                                      <p:cBhvr>
+                                        <p:cTn id="46" dur="1" fill="hold">
+                                          <p:stCondLst>
+                                            <p:cond delay="0"/>
+                                          </p:stCondLst>
+                                        </p:cTn>
+                                        <p:tgtEl>
+                                          <p:spTgt spid="52"/>
+                                        </p:tgtEl>
+                                        <p:attrNameLst>
+                                          <p:attrName>style.visibility</p:attrName>
+                                        </p:attrNameLst>
+                                      </p:cBhvr>
+                                      <p:to>
+                                        <p:strVal val="visible"/>
+                                      </p:to>
+                                    </p:set>
+                                    <p:animEffect transition="in" filter="fade">
+                                      <p:cBhvr>
+                                        <p:cTn id="47" dur="2000"/>
+                                        <p:tgtEl>
+                                          <p:spTgt spid="52"/>
+                                        </p:tgtEl>
+                                      </p:cBhvr>
+                                    </p:animEffect>
+                                  </p:childTnLst>
+                                </p:cTn>
+                              </p:par>
+                            </p:childTnLst>
+                          </p:cTn>
+                        </p:par>
+                        <p:par>
+                          <p:cTn id="48" fill="hold">
+                            <p:stCondLst>
+                              <p:cond delay="12000"/>
+                            </p:stCondLst>
+                            <p:childTnLst>
+                              <p:par>
+                                <p:cTn id="49" presetID="1" presetClass="entr" presetSubtype="0" fill="hold" nodeType="afterEffect">
+                                  <p:stCondLst>
+                                    <p:cond delay="0"/>
+                                  </p:stCondLst>
+                                  <p:childTnLst>
+                                    <p:set>
+                                      <p:cBhvr>
+                                        <p:cTn id="50" dur="1" fill="hold">
+                                          <p:stCondLst>
+                                            <p:cond delay="1999"/>
+                                          </p:stCondLst>
+                                        </p:cTn>
+                                        <p:tgtEl>
+                                          <p:spTgt spid="29"/>
+                                        </p:tgtEl>
+                                        <p:attrNameLst>
+                                          <p:attrName>style.visibility</p:attrName>
+                                        </p:attrNameLst>
+                                      </p:cBhvr>
+                                      <p:to>
+                                        <p:strVal val="visible"/>
+                                      </p:to>
+                                    </p:set>
+                                  </p:childTnLst>
+                                </p:cTn>
+                              </p:par>
+                              <p:par>
+                                <p:cTn id="51" presetID="1" presetClass="exit" presetSubtype="0" fill="hold" nodeType="withEffect">
+                                  <p:stCondLst>
+                                    <p:cond delay="0"/>
+                                  </p:stCondLst>
+                                  <p:childTnLst>
+                                    <p:set>
+                                      <p:cBhvr>
+                                        <p:cTn id="52" dur="1" fill="hold">
+                                          <p:stCondLst>
+                                            <p:cond delay="0"/>
+                                          </p:stCondLst>
+                                        </p:cTn>
+                                        <p:tgtEl>
+                                          <p:spTgt spid="9"/>
+                                        </p:tgtEl>
+                                        <p:attrNameLst>
+                                          <p:attrName>style.visibility</p:attrName>
+                                        </p:attrNameLst>
+                                      </p:cBhvr>
+                                      <p:to>
+                                        <p:strVal val="hidden"/>
+                                      </p:to>
+                                    </p:set>
+                                  </p:childTnLst>
+                                </p:cTn>
+                              </p:par>
+                            </p:childTnLst>
+                          </p:cTn>
+                        </p:par>
+                        <p:par>
+                          <p:cTn id="53" fill="hold">
+                            <p:stCondLst>
+                              <p:cond delay="14000"/>
+                            </p:stCondLst>
+                            <p:childTnLst>
+                              <p:par>
+                                <p:cTn id="54" presetID="1" presetClass="entr" presetSubtype="0" fill="hold" nodeType="afterEffect">
+                                  <p:stCondLst>
+                                    <p:cond delay="1000"/>
+                                  </p:stCondLst>
+                                  <p:childTnLst>
+                                    <p:set>
+                                      <p:cBhvr>
+                                        <p:cTn id="55" dur="1" fill="hold">
+                                          <p:stCondLst>
+                                            <p:cond delay="0"/>
+                                          </p:stCondLst>
+                                        </p:cTn>
+                                        <p:tgtEl>
+                                          <p:spTgt spid="12"/>
+                                        </p:tgtEl>
+                                        <p:attrNameLst>
+                                          <p:attrName>style.visibility</p:attrName>
+                                        </p:attrNameLst>
+                                      </p:cBhvr>
+                                      <p:to>
+                                        <p:strVal val="visible"/>
+                                      </p:to>
+                                    </p:set>
+                                  </p:childTnLst>
+                                </p:cTn>
+                              </p:par>
+                            </p:childTnLst>
+                          </p:cTn>
+                        </p:par>
+                        <p:par>
+                          <p:cTn id="56" fill="hold">
+                            <p:stCondLst>
+                              <p:cond delay="15000"/>
+                            </p:stCondLst>
+                            <p:childTnLst>
+                              <p:par>
+                                <p:cTn id="57" presetID="1" presetClass="entr" presetSubtype="0" fill="hold" nodeType="afterEffect">
+                                  <p:stCondLst>
+                                    <p:cond delay="1000"/>
+                                  </p:stCondLst>
+                                  <p:childTnLst>
+                                    <p:set>
+                                      <p:cBhvr>
+                                        <p:cTn id="58" dur="1" fill="hold">
+                                          <p:stCondLst>
+                                            <p:cond delay="0"/>
+                                          </p:stCondLst>
+                                        </p:cTn>
+                                        <p:tgtEl>
+                                          <p:spTgt spid="34"/>
+                                        </p:tgtEl>
+                                        <p:attrNameLst>
+                                          <p:attrName>style.visibility</p:attrName>
+                                        </p:attrNameLst>
+                                      </p:cBhvr>
+                                      <p:to>
+                                        <p:strVal val="visible"/>
+                                      </p:to>
+                                    </p:set>
+                                  </p:childTnLst>
+                                </p:cTn>
+                              </p:par>
+                            </p:childTnLst>
+                          </p:cTn>
+                        </p:par>
+                        <p:par>
+                          <p:cTn id="59" fill="hold">
+                            <p:stCondLst>
+                              <p:cond delay="16000"/>
+                            </p:stCondLst>
+                            <p:childTnLst>
+                              <p:par>
+                                <p:cTn id="60" presetID="1" presetClass="entr" presetSubtype="0" fill="hold" nodeType="afterEffect">
+                                  <p:stCondLst>
+                                    <p:cond delay="1000"/>
+                                  </p:stCondLst>
+                                  <p:childTnLst>
+                                    <p:set>
+                                      <p:cBhvr>
+                                        <p:cTn id="61" dur="1" fill="hold">
+                                          <p:stCondLst>
+                                            <p:cond delay="0"/>
+                                          </p:stCondLst>
+                                        </p:cTn>
+                                        <p:tgtEl>
+                                          <p:spTgt spid="37"/>
+                                        </p:tgtEl>
+                                        <p:attrNameLst>
+                                          <p:attrName>style.visibility</p:attrName>
+                                        </p:attrNameLst>
+                                      </p:cBhvr>
+                                      <p:to>
+                                        <p:strVal val="visible"/>
+                                      </p:to>
+                                    </p:set>
+                                  </p:childTnLst>
+                                </p:cTn>
+                              </p:par>
+                            </p:childTnLst>
+                          </p:cTn>
+                        </p:par>
+                        <p:par>
+                          <p:cTn id="62" fill="hold">
+                            <p:stCondLst>
+                              <p:cond delay="17000"/>
+                            </p:stCondLst>
+                            <p:childTnLst>
+                              <p:par>
+                                <p:cTn id="63" presetID="1" presetClass="entr" presetSubtype="0" fill="hold" nodeType="afterEffect">
+                                  <p:stCondLst>
+                                    <p:cond delay="1000"/>
+                                  </p:stCondLst>
+                                  <p:childTnLst>
+                                    <p:set>
+                                      <p:cBhvr>
+                                        <p:cTn id="64" dur="1" fill="hold">
+                                          <p:stCondLst>
+                                            <p:cond delay="0"/>
+                                          </p:stCondLst>
+                                        </p:cTn>
+                                        <p:tgtEl>
+                                          <p:spTgt spid="40"/>
+                                        </p:tgtEl>
+                                        <p:attrNameLst>
+                                          <p:attrName>style.visibility</p:attrName>
+                                        </p:attrNameLst>
+                                      </p:cBhvr>
+                                      <p:to>
+                                        <p:strVal val="visible"/>
+                                      </p:to>
+                                    </p:set>
+                                  </p:childTnLst>
+                                </p:cTn>
+                              </p:par>
+                            </p:childTnLst>
+                          </p:cTn>
+                        </p:par>
+                      </p:childTnLst>
+                    </p:cTn>
+                  </p:par>
+                </p:childTnLst>
+              </p:cTn>
+              <p:prevCondLst>
+                <p:cond evt="onPrev" delay="0">
+                  <p:tgtEl>
+                    <p:sldTgt/>
+                  </p:tgtEl>
+                </p:cond>
+              </p:prevCondLst>
+              <p:nextCondLst>
+                <p:cond evt="onNext" delay="0">
+                  <p:tgtEl>
+                    <p:sldTgt/>
+                  </p:tgtEl>
+                </p:cond>
+              </p:nextCondLst>
+            </p:seq>
+          </p:childTnLst>
+        </p:cTn>
+      </p:par>
+    </p:tnLst>
+  </p:timing>
+</p:sld>
+</file>
+
 <file path=ppt/theme/theme1.xml><?xml version="1.0" encoding="utf-8"?>
 <a:theme xmlns:a="http://schemas.openxmlformats.org/drawingml/2006/main" name="Tema de Office">
   <a:themeElements>

</xml_diff>